<commit_message>
data extraction cleaning slide
</commit_message>
<xml_diff>
--- a/UCBproj1.pptx
+++ b/UCBproj1.pptx
@@ -5,10 +5,10 @@
     <p:sldMasterId id="2147483666" r:id="rId4"/>
   </p:sldMasterIdLst>
   <p:notesMasterIdLst>
-    <p:notesMasterId r:id="rId18"/>
+    <p:notesMasterId r:id="rId19"/>
   </p:notesMasterIdLst>
   <p:handoutMasterIdLst>
-    <p:handoutMasterId r:id="rId19"/>
+    <p:handoutMasterId r:id="rId20"/>
   </p:handoutMasterIdLst>
   <p:sldIdLst>
     <p:sldId id="314" r:id="rId5"/>
@@ -16,14 +16,15 @@
     <p:sldId id="316" r:id="rId7"/>
     <p:sldId id="317" r:id="rId8"/>
     <p:sldId id="318" r:id="rId9"/>
-    <p:sldId id="319" r:id="rId10"/>
-    <p:sldId id="320" r:id="rId11"/>
-    <p:sldId id="321" r:id="rId12"/>
-    <p:sldId id="322" r:id="rId13"/>
-    <p:sldId id="323" r:id="rId14"/>
-    <p:sldId id="324" r:id="rId15"/>
-    <p:sldId id="325" r:id="rId16"/>
-    <p:sldId id="309" r:id="rId17"/>
+    <p:sldId id="326" r:id="rId10"/>
+    <p:sldId id="319" r:id="rId11"/>
+    <p:sldId id="320" r:id="rId12"/>
+    <p:sldId id="321" r:id="rId13"/>
+    <p:sldId id="322" r:id="rId14"/>
+    <p:sldId id="323" r:id="rId15"/>
+    <p:sldId id="324" r:id="rId16"/>
+    <p:sldId id="325" r:id="rId17"/>
+    <p:sldId id="309" r:id="rId18"/>
   </p:sldIdLst>
   <p:sldSz cx="12192000" cy="6858000"/>
   <p:notesSz cx="6858000" cy="9144000"/>
@@ -852,7 +853,7 @@
     </p:spTree>
     <p:extLst>
       <p:ext uri="{BB962C8B-B14F-4D97-AF65-F5344CB8AC3E}">
-        <p14:creationId xmlns:p14="http://schemas.microsoft.com/office/powerpoint/2010/main" val="4110010862"/>
+        <p14:creationId xmlns:p14="http://schemas.microsoft.com/office/powerpoint/2010/main" val="2586565686"/>
       </p:ext>
     </p:extLst>
   </p:cSld>
@@ -936,7 +937,7 @@
     </p:spTree>
     <p:extLst>
       <p:ext uri="{BB962C8B-B14F-4D97-AF65-F5344CB8AC3E}">
-        <p14:creationId xmlns:p14="http://schemas.microsoft.com/office/powerpoint/2010/main" val="679238203"/>
+        <p14:creationId xmlns:p14="http://schemas.microsoft.com/office/powerpoint/2010/main" val="4110010862"/>
       </p:ext>
     </p:extLst>
   </p:cSld>
@@ -1020,7 +1021,7 @@
     </p:spTree>
     <p:extLst>
       <p:ext uri="{BB962C8B-B14F-4D97-AF65-F5344CB8AC3E}">
-        <p14:creationId xmlns:p14="http://schemas.microsoft.com/office/powerpoint/2010/main" val="2261767694"/>
+        <p14:creationId xmlns:p14="http://schemas.microsoft.com/office/powerpoint/2010/main" val="679238203"/>
       </p:ext>
     </p:extLst>
   </p:cSld>
@@ -1096,6 +1097,90 @@
             <a:fld id="{D4B9A9E5-4F7F-4A7D-9DE1-899232329269}" type="slidenum">
               <a:rPr lang="en-US" smtClean="0"/>
               <a:t>13</a:t>
+            </a:fld>
+            <a:endParaRPr lang="en-US" dirty="0"/>
+          </a:p>
+        </p:txBody>
+      </p:sp>
+    </p:spTree>
+    <p:extLst>
+      <p:ext uri="{BB962C8B-B14F-4D97-AF65-F5344CB8AC3E}">
+        <p14:creationId xmlns:p14="http://schemas.microsoft.com/office/powerpoint/2010/main" val="2261767694"/>
+      </p:ext>
+    </p:extLst>
+  </p:cSld>
+  <p:clrMapOvr>
+    <a:masterClrMapping/>
+  </p:clrMapOvr>
+</p:notes>
+</file>
+
+<file path=ppt/notesSlides/notesSlide14.xml><?xml version="1.0" encoding="utf-8"?>
+<p:notes xmlns:a="http://schemas.openxmlformats.org/drawingml/2006/main" xmlns:r="http://schemas.openxmlformats.org/officeDocument/2006/relationships" xmlns:p="http://schemas.openxmlformats.org/presentationml/2006/main">
+  <p:cSld>
+    <p:spTree>
+      <p:nvGrpSpPr>
+        <p:cNvPr id="1" name=""/>
+        <p:cNvGrpSpPr/>
+        <p:nvPr/>
+      </p:nvGrpSpPr>
+      <p:grpSpPr>
+        <a:xfrm>
+          <a:off x="0" y="0"/>
+          <a:ext cx="0" cy="0"/>
+          <a:chOff x="0" y="0"/>
+          <a:chExt cx="0" cy="0"/>
+        </a:xfrm>
+      </p:grpSpPr>
+      <p:sp>
+        <p:nvSpPr>
+          <p:cNvPr id="2" name="Slide Image Placeholder 1"/>
+          <p:cNvSpPr>
+            <a:spLocks noGrp="1" noRot="1" noChangeAspect="1"/>
+          </p:cNvSpPr>
+          <p:nvPr>
+            <p:ph type="sldImg"/>
+          </p:nvPr>
+        </p:nvSpPr>
+        <p:spPr/>
+      </p:sp>
+      <p:sp>
+        <p:nvSpPr>
+          <p:cNvPr id="3" name="Notes Placeholder 2"/>
+          <p:cNvSpPr>
+            <a:spLocks noGrp="1"/>
+          </p:cNvSpPr>
+          <p:nvPr>
+            <p:ph type="body" idx="1"/>
+          </p:nvPr>
+        </p:nvSpPr>
+        <p:spPr/>
+        <p:txBody>
+          <a:bodyPr/>
+          <a:lstStyle/>
+          <a:p>
+            <a:endParaRPr lang="en-US" dirty="0"/>
+          </a:p>
+        </p:txBody>
+      </p:sp>
+      <p:sp>
+        <p:nvSpPr>
+          <p:cNvPr id="4" name="Slide Number Placeholder 3"/>
+          <p:cNvSpPr>
+            <a:spLocks noGrp="1"/>
+          </p:cNvSpPr>
+          <p:nvPr>
+            <p:ph type="sldNum" sz="quarter" idx="5"/>
+          </p:nvPr>
+        </p:nvSpPr>
+        <p:spPr/>
+        <p:txBody>
+          <a:bodyPr/>
+          <a:lstStyle/>
+          <a:p>
+            <a:fld id="{D4B9A9E5-4F7F-4A7D-9DE1-899232329269}" type="slidenum">
+              <a:rPr lang="en-US" smtClean="0"/>
+              <a:t>14</a:t>
             </a:fld>
             <a:endParaRPr lang="en-US" dirty="0"/>
           </a:p>
@@ -1524,7 +1609,7 @@
     </p:spTree>
     <p:extLst>
       <p:ext uri="{BB962C8B-B14F-4D97-AF65-F5344CB8AC3E}">
-        <p14:creationId xmlns:p14="http://schemas.microsoft.com/office/powerpoint/2010/main" val="3486472807"/>
+        <p14:creationId xmlns:p14="http://schemas.microsoft.com/office/powerpoint/2010/main" val="1293868306"/>
       </p:ext>
     </p:extLst>
   </p:cSld>
@@ -1608,7 +1693,7 @@
     </p:spTree>
     <p:extLst>
       <p:ext uri="{BB962C8B-B14F-4D97-AF65-F5344CB8AC3E}">
-        <p14:creationId xmlns:p14="http://schemas.microsoft.com/office/powerpoint/2010/main" val="3555126551"/>
+        <p14:creationId xmlns:p14="http://schemas.microsoft.com/office/powerpoint/2010/main" val="3486472807"/>
       </p:ext>
     </p:extLst>
   </p:cSld>
@@ -1692,7 +1777,7 @@
     </p:spTree>
     <p:extLst>
       <p:ext uri="{BB962C8B-B14F-4D97-AF65-F5344CB8AC3E}">
-        <p14:creationId xmlns:p14="http://schemas.microsoft.com/office/powerpoint/2010/main" val="3984229589"/>
+        <p14:creationId xmlns:p14="http://schemas.microsoft.com/office/powerpoint/2010/main" val="3555126551"/>
       </p:ext>
     </p:extLst>
   </p:cSld>
@@ -1776,7 +1861,7 @@
     </p:spTree>
     <p:extLst>
       <p:ext uri="{BB962C8B-B14F-4D97-AF65-F5344CB8AC3E}">
-        <p14:creationId xmlns:p14="http://schemas.microsoft.com/office/powerpoint/2010/main" val="2586565686"/>
+        <p14:creationId xmlns:p14="http://schemas.microsoft.com/office/powerpoint/2010/main" val="3984229589"/>
       </p:ext>
     </p:extLst>
   </p:cSld>
@@ -6690,6 +6775,186 @@
 </file>
 
 <file path=ppt/slides/slide10.xml><?xml version="1.0" encoding="utf-8"?>
+<p:sld xmlns:a="http://schemas.openxmlformats.org/drawingml/2006/main" xmlns:r="http://schemas.openxmlformats.org/officeDocument/2006/relationships" xmlns:p="http://schemas.openxmlformats.org/presentationml/2006/main">
+  <p:cSld>
+    <p:spTree>
+      <p:nvGrpSpPr>
+        <p:cNvPr id="1" name=""/>
+        <p:cNvGrpSpPr/>
+        <p:nvPr/>
+      </p:nvGrpSpPr>
+      <p:grpSpPr>
+        <a:xfrm>
+          <a:off x="0" y="0"/>
+          <a:ext cx="0" cy="0"/>
+          <a:chOff x="0" y="0"/>
+          <a:chExt cx="0" cy="0"/>
+        </a:xfrm>
+      </p:grpSpPr>
+      <p:sp>
+        <p:nvSpPr>
+          <p:cNvPr id="2" name="Title 1">
+            <a:extLst>
+              <a:ext uri="{FF2B5EF4-FFF2-40B4-BE49-F238E27FC236}">
+                <a16:creationId xmlns:a16="http://schemas.microsoft.com/office/drawing/2014/main" id="{56FEAA13-E02F-EB47-E510-E3F48A95F847}"/>
+              </a:ext>
+            </a:extLst>
+          </p:cNvPr>
+          <p:cNvSpPr>
+            <a:spLocks noGrp="1"/>
+          </p:cNvSpPr>
+          <p:nvPr>
+            <p:ph type="title"/>
+          </p:nvPr>
+        </p:nvSpPr>
+        <p:spPr>
+          <a:xfrm>
+            <a:off x="916385" y="446313"/>
+            <a:ext cx="5179615" cy="1448747"/>
+          </a:xfrm>
+        </p:spPr>
+        <p:txBody>
+          <a:bodyPr/>
+          <a:lstStyle/>
+          <a:p>
+            <a:r>
+              <a:rPr lang="en-US" dirty="0"/>
+              <a:t>[INSERT]</a:t>
+            </a:r>
+          </a:p>
+        </p:txBody>
+      </p:sp>
+      <p:sp>
+        <p:nvSpPr>
+          <p:cNvPr id="3" name="Content Placeholder 2">
+            <a:extLst>
+              <a:ext uri="{FF2B5EF4-FFF2-40B4-BE49-F238E27FC236}">
+                <a16:creationId xmlns:a16="http://schemas.microsoft.com/office/drawing/2014/main" id="{05E26637-007F-EC9E-F644-AAFBA0900F3C}"/>
+              </a:ext>
+            </a:extLst>
+          </p:cNvPr>
+          <p:cNvSpPr>
+            <a:spLocks noGrp="1"/>
+          </p:cNvSpPr>
+          <p:nvPr>
+            <p:ph sz="quarter" idx="10"/>
+          </p:nvPr>
+        </p:nvSpPr>
+        <p:spPr>
+          <a:xfrm>
+            <a:off x="914399" y="2022250"/>
+            <a:ext cx="5181600" cy="3747180"/>
+          </a:xfrm>
+        </p:spPr>
+        <p:txBody>
+          <a:bodyPr/>
+          <a:lstStyle/>
+          <a:p>
+            <a:r>
+              <a:rPr lang="en-US" b="1" dirty="0"/>
+              <a:t>19XX: </a:t>
+            </a:r>
+            <a:r>
+              <a:rPr lang="en-US" dirty="0"/>
+              <a:t>…</a:t>
+            </a:r>
+          </a:p>
+          <a:p>
+            <a:r>
+              <a:rPr lang="en-US" b="1" dirty="0"/>
+              <a:t>20XX: </a:t>
+            </a:r>
+            <a:r>
+              <a:rPr lang="en-US" dirty="0"/>
+              <a:t>…</a:t>
+            </a:r>
+          </a:p>
+          <a:p>
+            <a:r>
+              <a:rPr lang="en-US" b="1" dirty="0"/>
+              <a:t>20XX: </a:t>
+            </a:r>
+            <a:r>
+              <a:rPr lang="en-US" dirty="0"/>
+              <a:t>…</a:t>
+            </a:r>
+          </a:p>
+        </p:txBody>
+      </p:sp>
+      <p:sp>
+        <p:nvSpPr>
+          <p:cNvPr id="5" name="Slide Number Placeholder 4">
+            <a:extLst>
+              <a:ext uri="{FF2B5EF4-FFF2-40B4-BE49-F238E27FC236}">
+                <a16:creationId xmlns:a16="http://schemas.microsoft.com/office/drawing/2014/main" id="{1DDD930B-FB1B-543D-6828-8C31F30BBD28}"/>
+              </a:ext>
+            </a:extLst>
+          </p:cNvPr>
+          <p:cNvSpPr>
+            <a:spLocks noGrp="1"/>
+          </p:cNvSpPr>
+          <p:nvPr>
+            <p:ph type="sldNum" sz="quarter" idx="4"/>
+          </p:nvPr>
+        </p:nvSpPr>
+        <p:spPr>
+          <a:xfrm>
+            <a:off x="914400" y="6246254"/>
+            <a:ext cx="631065" cy="296214"/>
+          </a:xfrm>
+        </p:spPr>
+        <p:txBody>
+          <a:bodyPr/>
+          <a:lstStyle/>
+          <a:p>
+            <a:fld id="{B5CEABB6-07DC-46E8-9B57-56EC44A396E5}" type="slidenum">
+              <a:rPr lang="en-US" smtClean="0"/>
+              <a:pPr/>
+              <a:t>10</a:t>
+            </a:fld>
+            <a:endParaRPr lang="en-US" dirty="0"/>
+          </a:p>
+        </p:txBody>
+      </p:sp>
+      <p:sp>
+        <p:nvSpPr>
+          <p:cNvPr id="6" name="Picture Placeholder 5">
+            <a:extLst>
+              <a:ext uri="{FF2B5EF4-FFF2-40B4-BE49-F238E27FC236}">
+                <a16:creationId xmlns:a16="http://schemas.microsoft.com/office/drawing/2014/main" id="{CFB9537F-2D4C-86A4-1E39-FC84A2DA89F4}"/>
+              </a:ext>
+            </a:extLst>
+          </p:cNvPr>
+          <p:cNvSpPr>
+            <a:spLocks noGrp="1"/>
+          </p:cNvSpPr>
+          <p:nvPr>
+            <p:ph type="pic" sz="quarter" idx="11"/>
+          </p:nvPr>
+        </p:nvSpPr>
+        <p:spPr/>
+        <p:txBody>
+          <a:bodyPr/>
+          <a:lstStyle/>
+          <a:p>
+            <a:endParaRPr lang="en-US"/>
+          </a:p>
+        </p:txBody>
+      </p:sp>
+    </p:spTree>
+    <p:extLst>
+      <p:ext uri="{BB962C8B-B14F-4D97-AF65-F5344CB8AC3E}">
+        <p14:creationId xmlns:p14="http://schemas.microsoft.com/office/powerpoint/2010/main" val="1517447069"/>
+      </p:ext>
+    </p:extLst>
+  </p:cSld>
+  <p:clrMapOvr>
+    <a:masterClrMapping/>
+  </p:clrMapOvr>
+</p:sld>
+</file>
+
+<file path=ppt/slides/slide11.xml><?xml version="1.0" encoding="utf-8"?>
 <p:sld xmlns:a="http://schemas.openxmlformats.org/drawingml/2006/main" xmlns:r="http://schemas.openxmlformats.org/officeDocument/2006/relationships" xmlns:p="http://schemas.openxmlformats.org/presentationml/2006/main">
   <p:cSld>
     <p:spTree>
@@ -7408,7 +7673,7 @@
             <a:fld id="{B5CEABB6-07DC-46E8-9B57-56EC44A396E5}" type="slidenum">
               <a:rPr lang="en-US" smtClean="0"/>
               <a:pPr/>
-              <a:t>10</a:t>
+              <a:t>11</a:t>
             </a:fld>
             <a:endParaRPr lang="en-US" dirty="0"/>
           </a:p>
@@ -7427,7 +7692,7 @@
 </p:sld>
 </file>
 
-<file path=ppt/slides/slide11.xml><?xml version="1.0" encoding="utf-8"?>
+<file path=ppt/slides/slide12.xml><?xml version="1.0" encoding="utf-8"?>
 <p:sld xmlns:a="http://schemas.openxmlformats.org/drawingml/2006/main" xmlns:r="http://schemas.openxmlformats.org/officeDocument/2006/relationships" xmlns:p="http://schemas.openxmlformats.org/presentationml/2006/main">
   <p:cSld>
     <p:spTree>
@@ -7569,7 +7834,7 @@
             <a:fld id="{B5CEABB6-07DC-46E8-9B57-56EC44A396E5}" type="slidenum">
               <a:rPr lang="en-US" smtClean="0"/>
               <a:pPr/>
-              <a:t>11</a:t>
+              <a:t>12</a:t>
             </a:fld>
             <a:endParaRPr lang="en-US" dirty="0"/>
           </a:p>
@@ -7588,7 +7853,7 @@
 </p:sld>
 </file>
 
-<file path=ppt/slides/slide12.xml><?xml version="1.0" encoding="utf-8"?>
+<file path=ppt/slides/slide13.xml><?xml version="1.0" encoding="utf-8"?>
 <p:sld xmlns:a="http://schemas.openxmlformats.org/drawingml/2006/main" xmlns:r="http://schemas.openxmlformats.org/officeDocument/2006/relationships" xmlns:p="http://schemas.openxmlformats.org/presentationml/2006/main">
   <p:cSld>
     <p:spTree>
@@ -8005,7 +8270,7 @@
             <a:fld id="{B5CEABB6-07DC-46E8-9B57-56EC44A396E5}" type="slidenum">
               <a:rPr lang="en-US" smtClean="0"/>
               <a:pPr/>
-              <a:t>12</a:t>
+              <a:t>13</a:t>
             </a:fld>
             <a:endParaRPr lang="en-US" dirty="0"/>
           </a:p>
@@ -8024,7 +8289,7 @@
 </p:sld>
 </file>
 
-<file path=ppt/slides/slide13.xml><?xml version="1.0" encoding="utf-8"?>
+<file path=ppt/slides/slide14.xml><?xml version="1.0" encoding="utf-8"?>
 <p:sld xmlns:a="http://schemas.openxmlformats.org/drawingml/2006/main" xmlns:r="http://schemas.openxmlformats.org/officeDocument/2006/relationships" xmlns:p="http://schemas.openxmlformats.org/presentationml/2006/main">
   <p:cSld>
     <p:bg>
@@ -8928,7 +9193,7 @@
           <p:cNvPr id="2" name="Title 1">
             <a:extLst>
               <a:ext uri="{FF2B5EF4-FFF2-40B4-BE49-F238E27FC236}">
-                <a16:creationId xmlns:a16="http://schemas.microsoft.com/office/drawing/2014/main" id="{14808221-C29B-07A3-B569-B8B466B1020B}"/>
+                <a16:creationId xmlns:a16="http://schemas.microsoft.com/office/drawing/2014/main" id="{F992D586-3F7C-3202-E4F4-1F65B9A7D428}"/>
               </a:ext>
             </a:extLst>
           </p:cNvPr>
@@ -8941,8 +9206,8 @@
         </p:nvSpPr>
         <p:spPr>
           <a:xfrm>
-            <a:off x="6096000" y="375285"/>
-            <a:ext cx="4896678" cy="3624984"/>
+            <a:off x="914399" y="365126"/>
+            <a:ext cx="10363201" cy="761126"/>
           </a:xfrm>
         </p:spPr>
         <p:txBody>
@@ -8951,17 +9216,17 @@
           <a:p>
             <a:r>
               <a:rPr lang="en-US" dirty="0"/>
-              <a:t>Discussion &amp; findings</a:t>
-            </a:r>
-          </a:p>
-        </p:txBody>
-      </p:sp>
-      <p:sp>
-        <p:nvSpPr>
-          <p:cNvPr id="3" name="Content Placeholder 2">
-            <a:extLst>
-              <a:ext uri="{FF2B5EF4-FFF2-40B4-BE49-F238E27FC236}">
-                <a16:creationId xmlns:a16="http://schemas.microsoft.com/office/drawing/2014/main" id="{D6BEA7D4-8B96-5A0E-252E-6B8E8B1CF178}"/>
+              <a:t>Data Extraction / Cleaning</a:t>
+            </a:r>
+          </a:p>
+        </p:txBody>
+      </p:sp>
+      <p:sp>
+        <p:nvSpPr>
+          <p:cNvPr id="5" name="Slide Number Placeholder 4">
+            <a:extLst>
+              <a:ext uri="{FF2B5EF4-FFF2-40B4-BE49-F238E27FC236}">
+                <a16:creationId xmlns:a16="http://schemas.microsoft.com/office/drawing/2014/main" id="{FD4FFC83-A1E8-FCEA-2C47-38C5ADAEA1CA}"/>
               </a:ext>
             </a:extLst>
           </p:cNvPr>
@@ -8969,52 +9234,2071 @@
             <a:spLocks noGrp="1"/>
           </p:cNvSpPr>
           <p:nvPr>
-            <p:ph sz="quarter" idx="10"/>
-          </p:nvPr>
-        </p:nvSpPr>
-        <p:spPr>
-          <a:xfrm>
-            <a:off x="6096000" y="4172990"/>
-            <a:ext cx="4896677" cy="2309726"/>
+            <p:ph type="sldNum" sz="quarter" idx="4"/>
+          </p:nvPr>
+        </p:nvSpPr>
+        <p:spPr>
+          <a:xfrm>
+            <a:off x="855133" y="6196660"/>
+            <a:ext cx="631065" cy="296214"/>
           </a:xfrm>
         </p:spPr>
         <p:txBody>
           <a:bodyPr/>
           <a:lstStyle/>
           <a:p>
-            <a:endParaRPr lang="en-US" noProof="1"/>
-          </a:p>
-        </p:txBody>
-      </p:sp>
-      <p:sp>
-        <p:nvSpPr>
-          <p:cNvPr id="6" name="Picture Placeholder 5">
-            <a:extLst>
-              <a:ext uri="{FF2B5EF4-FFF2-40B4-BE49-F238E27FC236}">
-                <a16:creationId xmlns:a16="http://schemas.microsoft.com/office/drawing/2014/main" id="{1BAFB510-8A22-60EC-15F4-DDD46A895925}"/>
-              </a:ext>
-            </a:extLst>
-          </p:cNvPr>
-          <p:cNvSpPr>
-            <a:spLocks noGrp="1"/>
-          </p:cNvSpPr>
-          <p:nvPr>
-            <p:ph type="pic" sz="quarter" idx="11"/>
-          </p:nvPr>
-        </p:nvSpPr>
-        <p:spPr/>
-        <p:txBody>
-          <a:bodyPr/>
+            <a:fld id="{B5CEABB6-07DC-46E8-9B57-56EC44A396E5}" type="slidenum">
+              <a:rPr lang="en-US" smtClean="0"/>
+              <a:pPr/>
+              <a:t>6</a:t>
+            </a:fld>
+            <a:endParaRPr lang="en-US" dirty="0"/>
+          </a:p>
+        </p:txBody>
+      </p:sp>
+      <p:sp>
+        <p:nvSpPr>
+          <p:cNvPr id="10" name="Rectangle: Rounded Corners 9">
+            <a:extLst>
+              <a:ext uri="{FF2B5EF4-FFF2-40B4-BE49-F238E27FC236}">
+                <a16:creationId xmlns:a16="http://schemas.microsoft.com/office/drawing/2014/main" id="{017D66AE-30EE-D435-CAA5-4DBB8C5BF143}"/>
+              </a:ext>
+            </a:extLst>
+          </p:cNvPr>
+          <p:cNvSpPr/>
+          <p:nvPr/>
+        </p:nvSpPr>
+        <p:spPr>
+          <a:xfrm>
+            <a:off x="93133" y="2285695"/>
+            <a:ext cx="1439333" cy="660400"/>
+          </a:xfrm>
+          <a:prstGeom prst="roundRect">
+            <a:avLst/>
+          </a:prstGeom>
+        </p:spPr>
+        <p:style>
+          <a:lnRef idx="2">
+            <a:schemeClr val="accent1">
+              <a:shade val="15000"/>
+            </a:schemeClr>
+          </a:lnRef>
+          <a:fillRef idx="1">
+            <a:schemeClr val="accent1"/>
+          </a:fillRef>
+          <a:effectRef idx="0">
+            <a:schemeClr val="accent1"/>
+          </a:effectRef>
+          <a:fontRef idx="minor">
+            <a:schemeClr val="lt1"/>
+          </a:fontRef>
+        </p:style>
+        <p:txBody>
+          <a:bodyPr rtlCol="0" anchor="ctr"/>
           <a:lstStyle/>
           <a:p>
-            <a:endParaRPr lang="en-US" dirty="0"/>
-          </a:p>
-        </p:txBody>
-      </p:sp>
+            <a:pPr algn="ctr"/>
+            <a:r>
+              <a:rPr lang="en-US" dirty="0">
+                <a:solidFill>
+                  <a:schemeClr val="tx1"/>
+                </a:solidFill>
+              </a:rPr>
+              <a:t>Wine Data</a:t>
+            </a:r>
+          </a:p>
+        </p:txBody>
+      </p:sp>
+      <p:sp>
+        <p:nvSpPr>
+          <p:cNvPr id="11" name="Rectangle: Rounded Corners 10">
+            <a:extLst>
+              <a:ext uri="{FF2B5EF4-FFF2-40B4-BE49-F238E27FC236}">
+                <a16:creationId xmlns:a16="http://schemas.microsoft.com/office/drawing/2014/main" id="{30F68EF6-62B9-9290-FEAC-10F01F3D38F7}"/>
+              </a:ext>
+            </a:extLst>
+          </p:cNvPr>
+          <p:cNvSpPr/>
+          <p:nvPr/>
+        </p:nvSpPr>
+        <p:spPr>
+          <a:xfrm>
+            <a:off x="93132" y="3798701"/>
+            <a:ext cx="1439333" cy="660400"/>
+          </a:xfrm>
+          <a:prstGeom prst="roundRect">
+            <a:avLst/>
+          </a:prstGeom>
+        </p:spPr>
+        <p:style>
+          <a:lnRef idx="2">
+            <a:schemeClr val="accent1">
+              <a:shade val="15000"/>
+            </a:schemeClr>
+          </a:lnRef>
+          <a:fillRef idx="1">
+            <a:schemeClr val="accent1"/>
+          </a:fillRef>
+          <a:effectRef idx="0">
+            <a:schemeClr val="accent1"/>
+          </a:effectRef>
+          <a:fontRef idx="minor">
+            <a:schemeClr val="lt1"/>
+          </a:fontRef>
+        </p:style>
+        <p:txBody>
+          <a:bodyPr rtlCol="0" anchor="ctr"/>
+          <a:lstStyle/>
+          <a:p>
+            <a:pPr algn="ctr"/>
+            <a:r>
+              <a:rPr lang="en-US" dirty="0">
+                <a:solidFill>
+                  <a:schemeClr val="tx1"/>
+                </a:solidFill>
+              </a:rPr>
+              <a:t>Climate Data</a:t>
+            </a:r>
+          </a:p>
+        </p:txBody>
+      </p:sp>
+      <p:sp>
+        <p:nvSpPr>
+          <p:cNvPr id="15" name="Arrow: Right 14">
+            <a:extLst>
+              <a:ext uri="{FF2B5EF4-FFF2-40B4-BE49-F238E27FC236}">
+                <a16:creationId xmlns:a16="http://schemas.microsoft.com/office/drawing/2014/main" id="{983C6341-0881-4B42-545C-4E4A463FE35F}"/>
+              </a:ext>
+            </a:extLst>
+          </p:cNvPr>
+          <p:cNvSpPr/>
+          <p:nvPr/>
+        </p:nvSpPr>
+        <p:spPr>
+          <a:xfrm>
+            <a:off x="1676399" y="4061167"/>
+            <a:ext cx="389467" cy="186267"/>
+          </a:xfrm>
+          <a:prstGeom prst="rightArrow">
+            <a:avLst/>
+          </a:prstGeom>
+          <a:solidFill>
+            <a:srgbClr val="00B0F0"/>
+          </a:solidFill>
+          <a:ln>
+            <a:noFill/>
+          </a:ln>
+        </p:spPr>
+        <p:style>
+          <a:lnRef idx="2">
+            <a:schemeClr val="accent1">
+              <a:shade val="15000"/>
+            </a:schemeClr>
+          </a:lnRef>
+          <a:fillRef idx="1">
+            <a:schemeClr val="accent1"/>
+          </a:fillRef>
+          <a:effectRef idx="0">
+            <a:schemeClr val="accent1"/>
+          </a:effectRef>
+          <a:fontRef idx="minor">
+            <a:schemeClr val="lt1"/>
+          </a:fontRef>
+        </p:style>
+        <p:txBody>
+          <a:bodyPr rtlCol="0" anchor="ctr"/>
+          <a:lstStyle/>
+          <a:p>
+            <a:pPr algn="ctr"/>
+            <a:endParaRPr lang="en-US"/>
+          </a:p>
+        </p:txBody>
+      </p:sp>
+      <p:pic>
+        <p:nvPicPr>
+          <p:cNvPr id="16" name="Graphic 15" descr="Speaker phone with solid fill">
+            <a:extLst>
+              <a:ext uri="{FF2B5EF4-FFF2-40B4-BE49-F238E27FC236}">
+                <a16:creationId xmlns:a16="http://schemas.microsoft.com/office/drawing/2014/main" id="{92D82273-EAA6-7EBC-0C05-0A1119DC8386}"/>
+              </a:ext>
+            </a:extLst>
+          </p:cNvPr>
+          <p:cNvPicPr>
+            <a:picLocks noChangeAspect="1"/>
+          </p:cNvPicPr>
+          <p:nvPr/>
+        </p:nvPicPr>
+        <p:blipFill>
+          <a:blip r:embed="rId3">
+            <a:extLst>
+              <a:ext uri="{96DAC541-7B7A-43D3-8B79-37D633B846F1}">
+                <asvg:svgBlip xmlns:asvg="http://schemas.microsoft.com/office/drawing/2016/SVG/main" r:embed="rId4"/>
+              </a:ext>
+            </a:extLst>
+          </a:blip>
+          <a:stretch>
+            <a:fillRect/>
+          </a:stretch>
+        </p:blipFill>
+        <p:spPr>
+          <a:xfrm>
+            <a:off x="2209800" y="3798701"/>
+            <a:ext cx="660400" cy="660400"/>
+          </a:xfrm>
+          <a:prstGeom prst="rect">
+            <a:avLst/>
+          </a:prstGeom>
+        </p:spPr>
+      </p:pic>
+      <p:pic>
+        <p:nvPicPr>
+          <p:cNvPr id="18" name="Graphic 17" descr="Document with solid fill">
+            <a:extLst>
+              <a:ext uri="{FF2B5EF4-FFF2-40B4-BE49-F238E27FC236}">
+                <a16:creationId xmlns:a16="http://schemas.microsoft.com/office/drawing/2014/main" id="{96151BF8-5415-AC89-360B-32857925E805}"/>
+              </a:ext>
+            </a:extLst>
+          </p:cNvPr>
+          <p:cNvPicPr>
+            <a:picLocks noChangeAspect="1"/>
+          </p:cNvPicPr>
+          <p:nvPr/>
+        </p:nvPicPr>
+        <p:blipFill>
+          <a:blip r:embed="rId5">
+            <a:extLst>
+              <a:ext uri="{96DAC541-7B7A-43D3-8B79-37D633B846F1}">
+                <asvg:svgBlip xmlns:asvg="http://schemas.microsoft.com/office/drawing/2016/SVG/main" r:embed="rId6"/>
+              </a:ext>
+            </a:extLst>
+          </a:blip>
+          <a:stretch>
+            <a:fillRect/>
+          </a:stretch>
+        </p:blipFill>
+        <p:spPr>
+          <a:xfrm>
+            <a:off x="2184424" y="2311094"/>
+            <a:ext cx="660400" cy="660400"/>
+          </a:xfrm>
+          <a:prstGeom prst="rect">
+            <a:avLst/>
+          </a:prstGeom>
+        </p:spPr>
+      </p:pic>
+      <p:sp>
+        <p:nvSpPr>
+          <p:cNvPr id="19" name="Arrow: Right 18">
+            <a:extLst>
+              <a:ext uri="{FF2B5EF4-FFF2-40B4-BE49-F238E27FC236}">
+                <a16:creationId xmlns:a16="http://schemas.microsoft.com/office/drawing/2014/main" id="{ED451B74-75BA-36DF-3784-DE3B48CD95D8}"/>
+              </a:ext>
+            </a:extLst>
+          </p:cNvPr>
+          <p:cNvSpPr/>
+          <p:nvPr/>
+        </p:nvSpPr>
+        <p:spPr>
+          <a:xfrm>
+            <a:off x="3014134" y="4061166"/>
+            <a:ext cx="389467" cy="186267"/>
+          </a:xfrm>
+          <a:prstGeom prst="rightArrow">
+            <a:avLst/>
+          </a:prstGeom>
+          <a:solidFill>
+            <a:srgbClr val="00B0F0"/>
+          </a:solidFill>
+          <a:ln>
+            <a:noFill/>
+          </a:ln>
+        </p:spPr>
+        <p:style>
+          <a:lnRef idx="2">
+            <a:schemeClr val="accent1">
+              <a:shade val="15000"/>
+            </a:schemeClr>
+          </a:lnRef>
+          <a:fillRef idx="1">
+            <a:schemeClr val="accent1"/>
+          </a:fillRef>
+          <a:effectRef idx="0">
+            <a:schemeClr val="accent1"/>
+          </a:effectRef>
+          <a:fontRef idx="minor">
+            <a:schemeClr val="lt1"/>
+          </a:fontRef>
+        </p:style>
+        <p:txBody>
+          <a:bodyPr rtlCol="0" anchor="ctr"/>
+          <a:lstStyle/>
+          <a:p>
+            <a:pPr algn="ctr"/>
+            <a:endParaRPr lang="en-US"/>
+          </a:p>
+        </p:txBody>
+      </p:sp>
+      <p:pic>
+        <p:nvPicPr>
+          <p:cNvPr id="20" name="Graphic 19" descr="Document with solid fill">
+            <a:extLst>
+              <a:ext uri="{FF2B5EF4-FFF2-40B4-BE49-F238E27FC236}">
+                <a16:creationId xmlns:a16="http://schemas.microsoft.com/office/drawing/2014/main" id="{4A093A22-E641-7781-C881-6AF2BE0DF53B}"/>
+              </a:ext>
+            </a:extLst>
+          </p:cNvPr>
+          <p:cNvPicPr>
+            <a:picLocks noChangeAspect="1"/>
+          </p:cNvPicPr>
+          <p:nvPr/>
+        </p:nvPicPr>
+        <p:blipFill>
+          <a:blip r:embed="rId5">
+            <a:extLst>
+              <a:ext uri="{96DAC541-7B7A-43D3-8B79-37D633B846F1}">
+                <asvg:svgBlip xmlns:asvg="http://schemas.microsoft.com/office/drawing/2016/SVG/main" r:embed="rId6"/>
+              </a:ext>
+            </a:extLst>
+          </a:blip>
+          <a:stretch>
+            <a:fillRect/>
+          </a:stretch>
+        </p:blipFill>
+        <p:spPr>
+          <a:xfrm>
+            <a:off x="3547535" y="3798701"/>
+            <a:ext cx="660400" cy="660400"/>
+          </a:xfrm>
+          <a:prstGeom prst="rect">
+            <a:avLst/>
+          </a:prstGeom>
+        </p:spPr>
+      </p:pic>
+      <p:pic>
+        <p:nvPicPr>
+          <p:cNvPr id="22" name="Graphic 21" descr="Network diagram with solid fill">
+            <a:extLst>
+              <a:ext uri="{FF2B5EF4-FFF2-40B4-BE49-F238E27FC236}">
+                <a16:creationId xmlns:a16="http://schemas.microsoft.com/office/drawing/2014/main" id="{EBEA15C9-0F39-6BD8-D0B6-E925A2FCEDAA}"/>
+              </a:ext>
+            </a:extLst>
+          </p:cNvPr>
+          <p:cNvPicPr>
+            <a:picLocks noChangeAspect="1"/>
+          </p:cNvPicPr>
+          <p:nvPr/>
+        </p:nvPicPr>
+        <p:blipFill>
+          <a:blip r:embed="rId7">
+            <a:extLst>
+              <a:ext uri="{96DAC541-7B7A-43D3-8B79-37D633B846F1}">
+                <asvg:svgBlip xmlns:asvg="http://schemas.microsoft.com/office/drawing/2016/SVG/main" r:embed="rId8"/>
+              </a:ext>
+            </a:extLst>
+          </a:blip>
+          <a:stretch>
+            <a:fillRect/>
+          </a:stretch>
+        </p:blipFill>
+        <p:spPr>
+          <a:xfrm>
+            <a:off x="4872567" y="2311094"/>
+            <a:ext cx="660400" cy="660400"/>
+          </a:xfrm>
+          <a:prstGeom prst="rect">
+            <a:avLst/>
+          </a:prstGeom>
+        </p:spPr>
+      </p:pic>
+      <p:pic>
+        <p:nvPicPr>
+          <p:cNvPr id="25" name="Graphic 24" descr="Paper with solid fill">
+            <a:extLst>
+              <a:ext uri="{FF2B5EF4-FFF2-40B4-BE49-F238E27FC236}">
+                <a16:creationId xmlns:a16="http://schemas.microsoft.com/office/drawing/2014/main" id="{81B628FC-4477-083D-AD79-7AF3E660560E}"/>
+              </a:ext>
+            </a:extLst>
+          </p:cNvPr>
+          <p:cNvPicPr>
+            <a:picLocks noChangeAspect="1"/>
+          </p:cNvPicPr>
+          <p:nvPr/>
+        </p:nvPicPr>
+        <p:blipFill>
+          <a:blip r:embed="rId9">
+            <a:extLst>
+              <a:ext uri="{96DAC541-7B7A-43D3-8B79-37D633B846F1}">
+                <asvg:svgBlip xmlns:asvg="http://schemas.microsoft.com/office/drawing/2016/SVG/main" r:embed="rId10"/>
+              </a:ext>
+            </a:extLst>
+          </a:blip>
+          <a:stretch>
+            <a:fillRect/>
+          </a:stretch>
+        </p:blipFill>
+        <p:spPr>
+          <a:xfrm>
+            <a:off x="7560710" y="2311094"/>
+            <a:ext cx="660401" cy="660401"/>
+          </a:xfrm>
+          <a:prstGeom prst="rect">
+            <a:avLst/>
+          </a:prstGeom>
+        </p:spPr>
+      </p:pic>
+      <p:sp>
+        <p:nvSpPr>
+          <p:cNvPr id="26" name="Arrow: Right 25">
+            <a:extLst>
+              <a:ext uri="{FF2B5EF4-FFF2-40B4-BE49-F238E27FC236}">
+                <a16:creationId xmlns:a16="http://schemas.microsoft.com/office/drawing/2014/main" id="{ACE95FAF-3BB7-A648-A9DB-19F890E935CB}"/>
+              </a:ext>
+            </a:extLst>
+          </p:cNvPr>
+          <p:cNvSpPr/>
+          <p:nvPr/>
+        </p:nvSpPr>
+        <p:spPr>
+          <a:xfrm>
+            <a:off x="1676399" y="2548160"/>
+            <a:ext cx="389467" cy="186267"/>
+          </a:xfrm>
+          <a:prstGeom prst="rightArrow">
+            <a:avLst/>
+          </a:prstGeom>
+          <a:solidFill>
+            <a:srgbClr val="7030A0"/>
+          </a:solidFill>
+          <a:ln>
+            <a:noFill/>
+          </a:ln>
+        </p:spPr>
+        <p:style>
+          <a:lnRef idx="2">
+            <a:schemeClr val="accent1">
+              <a:shade val="15000"/>
+            </a:schemeClr>
+          </a:lnRef>
+          <a:fillRef idx="1">
+            <a:schemeClr val="accent1"/>
+          </a:fillRef>
+          <a:effectRef idx="0">
+            <a:schemeClr val="accent1"/>
+          </a:effectRef>
+          <a:fontRef idx="minor">
+            <a:schemeClr val="lt1"/>
+          </a:fontRef>
+        </p:style>
+        <p:txBody>
+          <a:bodyPr rtlCol="0" anchor="ctr"/>
+          <a:lstStyle/>
+          <a:p>
+            <a:pPr algn="ctr"/>
+            <a:endParaRPr lang="en-US"/>
+          </a:p>
+        </p:txBody>
+      </p:sp>
+      <p:pic>
+        <p:nvPicPr>
+          <p:cNvPr id="31" name="Picture 30" descr="A black cat with a white circle&#10;&#10;Description automatically generated">
+            <a:extLst>
+              <a:ext uri="{FF2B5EF4-FFF2-40B4-BE49-F238E27FC236}">
+                <a16:creationId xmlns:a16="http://schemas.microsoft.com/office/drawing/2014/main" id="{6581960D-5AB9-9700-0068-40C6DD7B7067}"/>
+              </a:ext>
+            </a:extLst>
+          </p:cNvPr>
+          <p:cNvPicPr>
+            <a:picLocks noChangeAspect="1"/>
+          </p:cNvPicPr>
+          <p:nvPr/>
+        </p:nvPicPr>
+        <p:blipFill>
+          <a:blip r:embed="rId11"/>
+          <a:stretch>
+            <a:fillRect/>
+          </a:stretch>
+        </p:blipFill>
+        <p:spPr>
+          <a:xfrm>
+            <a:off x="10710480" y="3049206"/>
+            <a:ext cx="660401" cy="660401"/>
+          </a:xfrm>
+          <a:prstGeom prst="rect">
+            <a:avLst/>
+          </a:prstGeom>
+        </p:spPr>
+      </p:pic>
+      <p:sp>
+        <p:nvSpPr>
+          <p:cNvPr id="32" name="Arrow: Right 31">
+            <a:extLst>
+              <a:ext uri="{FF2B5EF4-FFF2-40B4-BE49-F238E27FC236}">
+                <a16:creationId xmlns:a16="http://schemas.microsoft.com/office/drawing/2014/main" id="{842F40B5-392F-26E3-D837-8616ABFE6129}"/>
+              </a:ext>
+            </a:extLst>
+          </p:cNvPr>
+          <p:cNvSpPr/>
+          <p:nvPr/>
+        </p:nvSpPr>
+        <p:spPr>
+          <a:xfrm>
+            <a:off x="10168564" y="3286271"/>
+            <a:ext cx="389467" cy="186267"/>
+          </a:xfrm>
+          <a:prstGeom prst="rightArrow">
+            <a:avLst/>
+          </a:prstGeom>
+          <a:solidFill>
+            <a:srgbClr val="F090F0"/>
+          </a:solidFill>
+          <a:ln>
+            <a:noFill/>
+          </a:ln>
+        </p:spPr>
+        <p:style>
+          <a:lnRef idx="2">
+            <a:schemeClr val="accent1">
+              <a:shade val="15000"/>
+            </a:schemeClr>
+          </a:lnRef>
+          <a:fillRef idx="1">
+            <a:schemeClr val="accent1"/>
+          </a:fillRef>
+          <a:effectRef idx="0">
+            <a:schemeClr val="accent1"/>
+          </a:effectRef>
+          <a:fontRef idx="minor">
+            <a:schemeClr val="lt1"/>
+          </a:fontRef>
+        </p:style>
+        <p:txBody>
+          <a:bodyPr rtlCol="0" anchor="ctr"/>
+          <a:lstStyle/>
+          <a:p>
+            <a:pPr algn="ctr"/>
+            <a:endParaRPr lang="en-US"/>
+          </a:p>
+        </p:txBody>
+      </p:sp>
+      <p:sp>
+        <p:nvSpPr>
+          <p:cNvPr id="33" name="Arrow: Right 32">
+            <a:extLst>
+              <a:ext uri="{FF2B5EF4-FFF2-40B4-BE49-F238E27FC236}">
+                <a16:creationId xmlns:a16="http://schemas.microsoft.com/office/drawing/2014/main" id="{4B714014-D266-9D08-03EA-31013D2E39BA}"/>
+              </a:ext>
+            </a:extLst>
+          </p:cNvPr>
+          <p:cNvSpPr/>
+          <p:nvPr/>
+        </p:nvSpPr>
+        <p:spPr>
+          <a:xfrm>
+            <a:off x="4351866" y="4061166"/>
+            <a:ext cx="389467" cy="186267"/>
+          </a:xfrm>
+          <a:prstGeom prst="rightArrow">
+            <a:avLst/>
+          </a:prstGeom>
+          <a:solidFill>
+            <a:srgbClr val="00B0F0"/>
+          </a:solidFill>
+          <a:ln>
+            <a:noFill/>
+          </a:ln>
+        </p:spPr>
+        <p:style>
+          <a:lnRef idx="2">
+            <a:schemeClr val="accent1">
+              <a:shade val="15000"/>
+            </a:schemeClr>
+          </a:lnRef>
+          <a:fillRef idx="1">
+            <a:schemeClr val="accent1"/>
+          </a:fillRef>
+          <a:effectRef idx="0">
+            <a:schemeClr val="accent1"/>
+          </a:effectRef>
+          <a:fontRef idx="minor">
+            <a:schemeClr val="lt1"/>
+          </a:fontRef>
+        </p:style>
+        <p:txBody>
+          <a:bodyPr rtlCol="0" anchor="ctr"/>
+          <a:lstStyle/>
+          <a:p>
+            <a:pPr algn="ctr"/>
+            <a:endParaRPr lang="en-US"/>
+          </a:p>
+        </p:txBody>
+      </p:sp>
+      <p:pic>
+        <p:nvPicPr>
+          <p:cNvPr id="34" name="Graphic 33" descr="Network diagram with solid fill">
+            <a:extLst>
+              <a:ext uri="{FF2B5EF4-FFF2-40B4-BE49-F238E27FC236}">
+                <a16:creationId xmlns:a16="http://schemas.microsoft.com/office/drawing/2014/main" id="{5AD3F274-03C1-E0DC-AC29-1F547F22679D}"/>
+              </a:ext>
+            </a:extLst>
+          </p:cNvPr>
+          <p:cNvPicPr>
+            <a:picLocks noChangeAspect="1"/>
+          </p:cNvPicPr>
+          <p:nvPr/>
+        </p:nvPicPr>
+        <p:blipFill>
+          <a:blip r:embed="rId7">
+            <a:extLst>
+              <a:ext uri="{96DAC541-7B7A-43D3-8B79-37D633B846F1}">
+                <asvg:svgBlip xmlns:asvg="http://schemas.microsoft.com/office/drawing/2016/SVG/main" r:embed="rId8"/>
+              </a:ext>
+            </a:extLst>
+          </a:blip>
+          <a:stretch>
+            <a:fillRect/>
+          </a:stretch>
+        </p:blipFill>
+        <p:spPr>
+          <a:xfrm>
+            <a:off x="4885264" y="3824099"/>
+            <a:ext cx="660400" cy="660400"/>
+          </a:xfrm>
+          <a:prstGeom prst="rect">
+            <a:avLst/>
+          </a:prstGeom>
+        </p:spPr>
+      </p:pic>
+      <p:pic>
+        <p:nvPicPr>
+          <p:cNvPr id="36" name="Graphic 35" descr="Circles with arrows with solid fill">
+            <a:extLst>
+              <a:ext uri="{FF2B5EF4-FFF2-40B4-BE49-F238E27FC236}">
+                <a16:creationId xmlns:a16="http://schemas.microsoft.com/office/drawing/2014/main" id="{28110E38-4F91-A96C-E644-50B5265CD1AF}"/>
+              </a:ext>
+            </a:extLst>
+          </p:cNvPr>
+          <p:cNvPicPr>
+            <a:picLocks noChangeAspect="1"/>
+          </p:cNvPicPr>
+          <p:nvPr/>
+        </p:nvPicPr>
+        <p:blipFill>
+          <a:blip r:embed="rId12">
+            <a:extLst>
+              <a:ext uri="{96DAC541-7B7A-43D3-8B79-37D633B846F1}">
+                <asvg:svgBlip xmlns:asvg="http://schemas.microsoft.com/office/drawing/2016/SVG/main" r:embed="rId13"/>
+              </a:ext>
+            </a:extLst>
+          </a:blip>
+          <a:stretch>
+            <a:fillRect/>
+          </a:stretch>
+        </p:blipFill>
+        <p:spPr>
+          <a:xfrm>
+            <a:off x="6222993" y="3824099"/>
+            <a:ext cx="660400" cy="660400"/>
+          </a:xfrm>
+          <a:prstGeom prst="rect">
+            <a:avLst/>
+          </a:prstGeom>
+        </p:spPr>
+      </p:pic>
+      <p:sp>
+        <p:nvSpPr>
+          <p:cNvPr id="37" name="Arrow: Right 36">
+            <a:extLst>
+              <a:ext uri="{FF2B5EF4-FFF2-40B4-BE49-F238E27FC236}">
+                <a16:creationId xmlns:a16="http://schemas.microsoft.com/office/drawing/2014/main" id="{FF3ED726-8DD5-44E6-0EF8-381832FEC090}"/>
+              </a:ext>
+            </a:extLst>
+          </p:cNvPr>
+          <p:cNvSpPr/>
+          <p:nvPr/>
+        </p:nvSpPr>
+        <p:spPr>
+          <a:xfrm>
+            <a:off x="5689600" y="4061165"/>
+            <a:ext cx="389467" cy="186267"/>
+          </a:xfrm>
+          <a:prstGeom prst="rightArrow">
+            <a:avLst/>
+          </a:prstGeom>
+          <a:solidFill>
+            <a:srgbClr val="00B0F0"/>
+          </a:solidFill>
+          <a:ln>
+            <a:noFill/>
+          </a:ln>
+        </p:spPr>
+        <p:style>
+          <a:lnRef idx="2">
+            <a:schemeClr val="accent1">
+              <a:shade val="15000"/>
+            </a:schemeClr>
+          </a:lnRef>
+          <a:fillRef idx="1">
+            <a:schemeClr val="accent1"/>
+          </a:fillRef>
+          <a:effectRef idx="0">
+            <a:schemeClr val="accent1"/>
+          </a:effectRef>
+          <a:fontRef idx="minor">
+            <a:schemeClr val="lt1"/>
+          </a:fontRef>
+        </p:style>
+        <p:txBody>
+          <a:bodyPr rtlCol="0" anchor="ctr"/>
+          <a:lstStyle/>
+          <a:p>
+            <a:pPr algn="ctr"/>
+            <a:endParaRPr lang="en-US"/>
+          </a:p>
+        </p:txBody>
+      </p:sp>
+      <p:sp>
+        <p:nvSpPr>
+          <p:cNvPr id="38" name="Arrow: Right 37">
+            <a:extLst>
+              <a:ext uri="{FF2B5EF4-FFF2-40B4-BE49-F238E27FC236}">
+                <a16:creationId xmlns:a16="http://schemas.microsoft.com/office/drawing/2014/main" id="{B779F584-061B-0C95-36B6-F84890D69719}"/>
+              </a:ext>
+            </a:extLst>
+          </p:cNvPr>
+          <p:cNvSpPr/>
+          <p:nvPr/>
+        </p:nvSpPr>
+        <p:spPr>
+          <a:xfrm>
+            <a:off x="7027319" y="4061165"/>
+            <a:ext cx="389467" cy="186267"/>
+          </a:xfrm>
+          <a:prstGeom prst="rightArrow">
+            <a:avLst/>
+          </a:prstGeom>
+          <a:solidFill>
+            <a:srgbClr val="00B0F0"/>
+          </a:solidFill>
+          <a:ln>
+            <a:noFill/>
+          </a:ln>
+        </p:spPr>
+        <p:style>
+          <a:lnRef idx="2">
+            <a:schemeClr val="accent1">
+              <a:shade val="15000"/>
+            </a:schemeClr>
+          </a:lnRef>
+          <a:fillRef idx="1">
+            <a:schemeClr val="accent1"/>
+          </a:fillRef>
+          <a:effectRef idx="0">
+            <a:schemeClr val="accent1"/>
+          </a:effectRef>
+          <a:fontRef idx="minor">
+            <a:schemeClr val="lt1"/>
+          </a:fontRef>
+        </p:style>
+        <p:txBody>
+          <a:bodyPr rtlCol="0" anchor="ctr"/>
+          <a:lstStyle/>
+          <a:p>
+            <a:pPr algn="ctr"/>
+            <a:endParaRPr lang="en-US"/>
+          </a:p>
+        </p:txBody>
+      </p:sp>
+      <p:pic>
+        <p:nvPicPr>
+          <p:cNvPr id="39" name="Graphic 38" descr="Paper with solid fill">
+            <a:extLst>
+              <a:ext uri="{FF2B5EF4-FFF2-40B4-BE49-F238E27FC236}">
+                <a16:creationId xmlns:a16="http://schemas.microsoft.com/office/drawing/2014/main" id="{6305CB14-34DC-4097-7AF2-929015546E14}"/>
+              </a:ext>
+            </a:extLst>
+          </p:cNvPr>
+          <p:cNvPicPr>
+            <a:picLocks noChangeAspect="1"/>
+          </p:cNvPicPr>
+          <p:nvPr/>
+        </p:nvPicPr>
+        <p:blipFill>
+          <a:blip r:embed="rId9">
+            <a:extLst>
+              <a:ext uri="{96DAC541-7B7A-43D3-8B79-37D633B846F1}">
+                <asvg:svgBlip xmlns:asvg="http://schemas.microsoft.com/office/drawing/2016/SVG/main" r:embed="rId10"/>
+              </a:ext>
+            </a:extLst>
+          </a:blip>
+          <a:stretch>
+            <a:fillRect/>
+          </a:stretch>
+        </p:blipFill>
+        <p:spPr>
+          <a:xfrm>
+            <a:off x="7560711" y="3798700"/>
+            <a:ext cx="660401" cy="660401"/>
+          </a:xfrm>
+          <a:prstGeom prst="rect">
+            <a:avLst/>
+          </a:prstGeom>
+        </p:spPr>
+      </p:pic>
+      <p:pic>
+        <p:nvPicPr>
+          <p:cNvPr id="41" name="Graphic 40" descr="Merger with solid fill">
+            <a:extLst>
+              <a:ext uri="{FF2B5EF4-FFF2-40B4-BE49-F238E27FC236}">
+                <a16:creationId xmlns:a16="http://schemas.microsoft.com/office/drawing/2014/main" id="{13C8381C-6B4F-4CF4-5B2A-F04B966A7177}"/>
+              </a:ext>
+            </a:extLst>
+          </p:cNvPr>
+          <p:cNvPicPr>
+            <a:picLocks noChangeAspect="1"/>
+          </p:cNvPicPr>
+          <p:nvPr/>
+        </p:nvPicPr>
+        <p:blipFill>
+          <a:blip r:embed="rId14">
+            <a:extLst>
+              <a:ext uri="{96DAC541-7B7A-43D3-8B79-37D633B846F1}">
+                <asvg:svgBlip xmlns:asvg="http://schemas.microsoft.com/office/drawing/2016/SVG/main" r:embed="rId15"/>
+              </a:ext>
+            </a:extLst>
+          </a:blip>
+          <a:stretch>
+            <a:fillRect/>
+          </a:stretch>
+        </p:blipFill>
+        <p:spPr>
+          <a:xfrm>
+            <a:off x="8497848" y="2953154"/>
+            <a:ext cx="948334" cy="948334"/>
+          </a:xfrm>
+          <a:prstGeom prst="rect">
+            <a:avLst/>
+          </a:prstGeom>
+        </p:spPr>
+      </p:pic>
+      <p:sp>
+        <p:nvSpPr>
+          <p:cNvPr id="42" name="Arrow: Right 41">
+            <a:extLst>
+              <a:ext uri="{FF2B5EF4-FFF2-40B4-BE49-F238E27FC236}">
+                <a16:creationId xmlns:a16="http://schemas.microsoft.com/office/drawing/2014/main" id="{D50E1E1C-7B6D-E72B-419E-F0C70A512068}"/>
+              </a:ext>
+            </a:extLst>
+          </p:cNvPr>
+          <p:cNvSpPr/>
+          <p:nvPr/>
+        </p:nvSpPr>
+        <p:spPr>
+          <a:xfrm>
+            <a:off x="2963382" y="2548161"/>
+            <a:ext cx="1777951" cy="191010"/>
+          </a:xfrm>
+          <a:prstGeom prst="rightArrow">
+            <a:avLst/>
+          </a:prstGeom>
+          <a:solidFill>
+            <a:srgbClr val="7030A0"/>
+          </a:solidFill>
+          <a:ln>
+            <a:noFill/>
+          </a:ln>
+        </p:spPr>
+        <p:style>
+          <a:lnRef idx="2">
+            <a:schemeClr val="accent1">
+              <a:shade val="15000"/>
+            </a:schemeClr>
+          </a:lnRef>
+          <a:fillRef idx="1">
+            <a:schemeClr val="accent1"/>
+          </a:fillRef>
+          <a:effectRef idx="0">
+            <a:schemeClr val="accent1"/>
+          </a:effectRef>
+          <a:fontRef idx="minor">
+            <a:schemeClr val="lt1"/>
+          </a:fontRef>
+        </p:style>
+        <p:txBody>
+          <a:bodyPr rtlCol="0" anchor="ctr"/>
+          <a:lstStyle/>
+          <a:p>
+            <a:pPr algn="ctr"/>
+            <a:endParaRPr lang="en-US"/>
+          </a:p>
+        </p:txBody>
+      </p:sp>
+      <p:sp>
+        <p:nvSpPr>
+          <p:cNvPr id="43" name="Arrow: Right 42">
+            <a:extLst>
+              <a:ext uri="{FF2B5EF4-FFF2-40B4-BE49-F238E27FC236}">
+                <a16:creationId xmlns:a16="http://schemas.microsoft.com/office/drawing/2014/main" id="{A95894E6-5C75-2A22-DF79-6A6D9FD8AADE}"/>
+              </a:ext>
+            </a:extLst>
+          </p:cNvPr>
+          <p:cNvSpPr/>
+          <p:nvPr/>
+        </p:nvSpPr>
+        <p:spPr>
+          <a:xfrm>
+            <a:off x="5657863" y="2550691"/>
+            <a:ext cx="1777951" cy="191010"/>
+          </a:xfrm>
+          <a:prstGeom prst="rightArrow">
+            <a:avLst/>
+          </a:prstGeom>
+          <a:solidFill>
+            <a:srgbClr val="7030A0"/>
+          </a:solidFill>
+          <a:ln>
+            <a:noFill/>
+          </a:ln>
+        </p:spPr>
+        <p:style>
+          <a:lnRef idx="2">
+            <a:schemeClr val="accent1">
+              <a:shade val="15000"/>
+            </a:schemeClr>
+          </a:lnRef>
+          <a:fillRef idx="1">
+            <a:schemeClr val="accent1"/>
+          </a:fillRef>
+          <a:effectRef idx="0">
+            <a:schemeClr val="accent1"/>
+          </a:effectRef>
+          <a:fontRef idx="minor">
+            <a:schemeClr val="lt1"/>
+          </a:fontRef>
+        </p:style>
+        <p:txBody>
+          <a:bodyPr rtlCol="0" anchor="ctr"/>
+          <a:lstStyle/>
+          <a:p>
+            <a:pPr algn="ctr"/>
+            <a:endParaRPr lang="en-US"/>
+          </a:p>
+        </p:txBody>
+      </p:sp>
+      <p:pic>
+        <p:nvPicPr>
+          <p:cNvPr id="44" name="Graphic 43" descr="Paper with solid fill">
+            <a:extLst>
+              <a:ext uri="{FF2B5EF4-FFF2-40B4-BE49-F238E27FC236}">
+                <a16:creationId xmlns:a16="http://schemas.microsoft.com/office/drawing/2014/main" id="{73CFD82F-1ACE-B540-C560-6FE2383077B7}"/>
+              </a:ext>
+            </a:extLst>
+          </p:cNvPr>
+          <p:cNvPicPr>
+            <a:picLocks noChangeAspect="1"/>
+          </p:cNvPicPr>
+          <p:nvPr/>
+        </p:nvPicPr>
+        <p:blipFill>
+          <a:blip r:embed="rId9">
+            <a:extLst>
+              <a:ext uri="{96DAC541-7B7A-43D3-8B79-37D633B846F1}">
+                <asvg:svgBlip xmlns:asvg="http://schemas.microsoft.com/office/drawing/2016/SVG/main" r:embed="rId10"/>
+              </a:ext>
+            </a:extLst>
+          </a:blip>
+          <a:stretch>
+            <a:fillRect/>
+          </a:stretch>
+        </p:blipFill>
+        <p:spPr>
+          <a:xfrm>
+            <a:off x="9355714" y="3094446"/>
+            <a:ext cx="660401" cy="660401"/>
+          </a:xfrm>
+          <a:prstGeom prst="rect">
+            <a:avLst/>
+          </a:prstGeom>
+        </p:spPr>
+      </p:pic>
+      <p:cxnSp>
+        <p:nvCxnSpPr>
+          <p:cNvPr id="50" name="Connector: Elbow 49">
+            <a:extLst>
+              <a:ext uri="{FF2B5EF4-FFF2-40B4-BE49-F238E27FC236}">
+                <a16:creationId xmlns:a16="http://schemas.microsoft.com/office/drawing/2014/main" id="{E1AA266E-A09F-EAE9-92F3-4A4E12C5E12A}"/>
+              </a:ext>
+            </a:extLst>
+          </p:cNvPr>
+          <p:cNvCxnSpPr>
+            <a:cxnSpLocks/>
+          </p:cNvCxnSpPr>
+          <p:nvPr/>
+        </p:nvCxnSpPr>
+        <p:spPr>
+          <a:xfrm rot="5400000">
+            <a:off x="9539335" y="3853291"/>
+            <a:ext cx="1512412" cy="1490278"/>
+          </a:xfrm>
+          <a:prstGeom prst="bentConnector3">
+            <a:avLst>
+              <a:gd name="adj1" fmla="val 50000"/>
+            </a:avLst>
+          </a:prstGeom>
+          <a:ln w="38100">
+            <a:solidFill>
+              <a:schemeClr val="tx1"/>
+            </a:solidFill>
+            <a:prstDash val="sysDash"/>
+            <a:tailEnd type="triangle"/>
+          </a:ln>
+        </p:spPr>
+        <p:style>
+          <a:lnRef idx="1">
+            <a:schemeClr val="accent1"/>
+          </a:lnRef>
+          <a:fillRef idx="0">
+            <a:schemeClr val="accent1"/>
+          </a:fillRef>
+          <a:effectRef idx="0">
+            <a:schemeClr val="accent1"/>
+          </a:effectRef>
+          <a:fontRef idx="minor">
+            <a:schemeClr val="tx1"/>
+          </a:fontRef>
+        </p:style>
+      </p:cxnSp>
+      <p:pic>
+        <p:nvPicPr>
+          <p:cNvPr id="54" name="Graphic 53" descr="Morse Code with solid fill">
+            <a:extLst>
+              <a:ext uri="{FF2B5EF4-FFF2-40B4-BE49-F238E27FC236}">
+                <a16:creationId xmlns:a16="http://schemas.microsoft.com/office/drawing/2014/main" id="{EBEDB49C-52D0-0858-45F9-9B378A15C7AA}"/>
+              </a:ext>
+            </a:extLst>
+          </p:cNvPr>
+          <p:cNvPicPr>
+            <a:picLocks noChangeAspect="1"/>
+          </p:cNvPicPr>
+          <p:nvPr/>
+        </p:nvPicPr>
+        <p:blipFill>
+          <a:blip r:embed="rId16">
+            <a:extLst>
+              <a:ext uri="{96DAC541-7B7A-43D3-8B79-37D633B846F1}">
+                <asvg:svgBlip xmlns:asvg="http://schemas.microsoft.com/office/drawing/2016/SVG/main" r:embed="rId17"/>
+              </a:ext>
+            </a:extLst>
+          </a:blip>
+          <a:stretch>
+            <a:fillRect/>
+          </a:stretch>
+        </p:blipFill>
+        <p:spPr>
+          <a:xfrm>
+            <a:off x="10854164" y="5715122"/>
+            <a:ext cx="660401" cy="660401"/>
+          </a:xfrm>
+          <a:prstGeom prst="rect">
+            <a:avLst/>
+          </a:prstGeom>
+        </p:spPr>
+      </p:pic>
+      <p:pic>
+        <p:nvPicPr>
+          <p:cNvPr id="60" name="Graphic 59" descr="Circles with arrows with solid fill">
+            <a:extLst>
+              <a:ext uri="{FF2B5EF4-FFF2-40B4-BE49-F238E27FC236}">
+                <a16:creationId xmlns:a16="http://schemas.microsoft.com/office/drawing/2014/main" id="{79AEDB1D-5D04-C7EB-6B09-79274251A608}"/>
+              </a:ext>
+            </a:extLst>
+          </p:cNvPr>
+          <p:cNvPicPr>
+            <a:picLocks noChangeAspect="1"/>
+          </p:cNvPicPr>
+          <p:nvPr/>
+        </p:nvPicPr>
+        <p:blipFill>
+          <a:blip r:embed="rId12">
+            <a:extLst>
+              <a:ext uri="{96DAC541-7B7A-43D3-8B79-37D633B846F1}">
+                <asvg:svgBlip xmlns:asvg="http://schemas.microsoft.com/office/drawing/2016/SVG/main" r:embed="rId13"/>
+              </a:ext>
+            </a:extLst>
+          </a:blip>
+          <a:stretch>
+            <a:fillRect/>
+          </a:stretch>
+        </p:blipFill>
+        <p:spPr>
+          <a:xfrm>
+            <a:off x="9194022" y="5807957"/>
+            <a:ext cx="660400" cy="660400"/>
+          </a:xfrm>
+          <a:prstGeom prst="rect">
+            <a:avLst/>
+          </a:prstGeom>
+        </p:spPr>
+      </p:pic>
+      <p:sp>
+        <p:nvSpPr>
+          <p:cNvPr id="61" name="Arrow: Right 60">
+            <a:extLst>
+              <a:ext uri="{FF2B5EF4-FFF2-40B4-BE49-F238E27FC236}">
+                <a16:creationId xmlns:a16="http://schemas.microsoft.com/office/drawing/2014/main" id="{9AA9A80D-485B-C637-7FCD-0758195C3E66}"/>
+              </a:ext>
+            </a:extLst>
+          </p:cNvPr>
+          <p:cNvSpPr/>
+          <p:nvPr/>
+        </p:nvSpPr>
+        <p:spPr>
+          <a:xfrm>
+            <a:off x="10159559" y="5991468"/>
+            <a:ext cx="389467" cy="186267"/>
+          </a:xfrm>
+          <a:prstGeom prst="rightArrow">
+            <a:avLst/>
+          </a:prstGeom>
+          <a:solidFill>
+            <a:srgbClr val="F090F0"/>
+          </a:solidFill>
+          <a:ln>
+            <a:noFill/>
+          </a:ln>
+        </p:spPr>
+        <p:style>
+          <a:lnRef idx="2">
+            <a:schemeClr val="accent1">
+              <a:shade val="15000"/>
+            </a:schemeClr>
+          </a:lnRef>
+          <a:fillRef idx="1">
+            <a:schemeClr val="accent1"/>
+          </a:fillRef>
+          <a:effectRef idx="0">
+            <a:schemeClr val="accent1"/>
+          </a:effectRef>
+          <a:fontRef idx="minor">
+            <a:schemeClr val="lt1"/>
+          </a:fontRef>
+        </p:style>
+        <p:txBody>
+          <a:bodyPr rtlCol="0" anchor="ctr"/>
+          <a:lstStyle/>
+          <a:p>
+            <a:pPr algn="ctr"/>
+            <a:endParaRPr lang="en-US"/>
+          </a:p>
+        </p:txBody>
+      </p:sp>
+      <p:graphicFrame>
+        <p:nvGraphicFramePr>
+          <p:cNvPr id="62" name="Table 61">
+            <a:extLst>
+              <a:ext uri="{FF2B5EF4-FFF2-40B4-BE49-F238E27FC236}">
+                <a16:creationId xmlns:a16="http://schemas.microsoft.com/office/drawing/2014/main" id="{F5E4A304-9680-65CF-4029-233BC7ACC6FA}"/>
+              </a:ext>
+            </a:extLst>
+          </p:cNvPr>
+          <p:cNvGraphicFramePr>
+            <a:graphicFrameLocks noGrp="1"/>
+          </p:cNvGraphicFramePr>
+          <p:nvPr>
+            <p:extLst>
+              <p:ext uri="{D42A27DB-BD31-4B8C-83A1-F6EECF244321}">
+                <p14:modId xmlns:p14="http://schemas.microsoft.com/office/powerpoint/2010/main" val="3564920697"/>
+              </p:ext>
+            </p:extLst>
+          </p:nvPr>
+        </p:nvGraphicFramePr>
+        <p:xfrm>
+          <a:off x="1528530" y="1492002"/>
+          <a:ext cx="8487585" cy="370840"/>
+        </p:xfrm>
+        <a:graphic>
+          <a:graphicData uri="http://schemas.openxmlformats.org/drawingml/2006/table">
+            <a:tbl>
+              <a:tblPr firstRow="1" bandRow="1">
+                <a:tableStyleId>{5C22544A-7EE6-4342-B048-85BDC9FD1C3A}</a:tableStyleId>
+              </a:tblPr>
+              <a:tblGrid>
+                <a:gridCol w="3195870">
+                  <a:extLst>
+                    <a:ext uri="{9D8B030D-6E8A-4147-A177-3AD203B41FA5}">
+                      <a16:colId xmlns:a16="http://schemas.microsoft.com/office/drawing/2014/main" val="579947472"/>
+                    </a:ext>
+                  </a:extLst>
+                </a:gridCol>
+                <a:gridCol w="5291715">
+                  <a:extLst>
+                    <a:ext uri="{9D8B030D-6E8A-4147-A177-3AD203B41FA5}">
+                      <a16:colId xmlns:a16="http://schemas.microsoft.com/office/drawing/2014/main" val="2468980752"/>
+                    </a:ext>
+                  </a:extLst>
+                </a:gridCol>
+              </a:tblGrid>
+              <a:tr h="370840">
+                <a:tc>
+                  <a:txBody>
+                    <a:bodyPr/>
+                    <a:lstStyle/>
+                    <a:p>
+                      <a:pPr algn="ctr"/>
+                      <a:r>
+                        <a:rPr lang="en-US" dirty="0"/>
+                        <a:t>Extraction</a:t>
+                      </a:r>
+                    </a:p>
+                  </a:txBody>
+                  <a:tcPr anchor="ctr">
+                    <a:lnL w="12700" cmpd="sng">
+                      <a:noFill/>
+                    </a:lnL>
+                    <a:lnR w="12700" cmpd="sng">
+                      <a:noFill/>
+                    </a:lnR>
+                    <a:lnT w="12700" cmpd="sng">
+                      <a:noFill/>
+                    </a:lnT>
+                    <a:lnB w="38100" cmpd="sng">
+                      <a:noFill/>
+                    </a:lnB>
+                    <a:lnTlToBr w="12700" cmpd="sng">
+                      <a:noFill/>
+                      <a:prstDash val="solid"/>
+                    </a:lnTlToBr>
+                    <a:lnBlToTr w="12700" cmpd="sng">
+                      <a:noFill/>
+                      <a:prstDash val="solid"/>
+                    </a:lnBlToTr>
+                    <a:solidFill>
+                      <a:schemeClr val="tx1">
+                        <a:lumMod val="50000"/>
+                        <a:lumOff val="50000"/>
+                      </a:schemeClr>
+                    </a:solidFill>
+                  </a:tcPr>
+                </a:tc>
+                <a:tc>
+                  <a:txBody>
+                    <a:bodyPr/>
+                    <a:lstStyle/>
+                    <a:p>
+                      <a:pPr algn="ctr"/>
+                      <a:r>
+                        <a:rPr lang="en-US" dirty="0"/>
+                        <a:t>Cleaning</a:t>
+                      </a:r>
+                    </a:p>
+                  </a:txBody>
+                  <a:tcPr anchor="ctr">
+                    <a:lnL w="12700" cmpd="sng">
+                      <a:noFill/>
+                    </a:lnL>
+                    <a:lnR w="12700" cmpd="sng">
+                      <a:noFill/>
+                    </a:lnR>
+                    <a:lnT w="12700" cmpd="sng">
+                      <a:noFill/>
+                    </a:lnT>
+                    <a:lnB w="38100" cmpd="sng">
+                      <a:noFill/>
+                    </a:lnB>
+                    <a:lnTlToBr w="12700" cmpd="sng">
+                      <a:noFill/>
+                      <a:prstDash val="solid"/>
+                    </a:lnTlToBr>
+                    <a:lnBlToTr w="12700" cmpd="sng">
+                      <a:noFill/>
+                      <a:prstDash val="solid"/>
+                    </a:lnBlToTr>
+                    <a:solidFill>
+                      <a:schemeClr val="bg2">
+                        <a:lumMod val="25000"/>
+                      </a:schemeClr>
+                    </a:solidFill>
+                  </a:tcPr>
+                </a:tc>
+                <a:extLst>
+                  <a:ext uri="{0D108BD9-81ED-4DB2-BD59-A6C34878D82A}">
+                    <a16:rowId xmlns:a16="http://schemas.microsoft.com/office/drawing/2014/main" val="197516280"/>
+                  </a:ext>
+                </a:extLst>
+              </a:tr>
+            </a:tbl>
+          </a:graphicData>
+        </a:graphic>
+      </p:graphicFrame>
+      <p:sp>
+        <p:nvSpPr>
+          <p:cNvPr id="63" name="TextBox 62">
+            <a:extLst>
+              <a:ext uri="{FF2B5EF4-FFF2-40B4-BE49-F238E27FC236}">
+                <a16:creationId xmlns:a16="http://schemas.microsoft.com/office/drawing/2014/main" id="{C248E6E1-F595-47ED-B08E-BC7ABB99BE6C}"/>
+              </a:ext>
+            </a:extLst>
+          </p:cNvPr>
+          <p:cNvSpPr txBox="1"/>
+          <p:nvPr/>
+        </p:nvSpPr>
+        <p:spPr>
+          <a:xfrm>
+            <a:off x="2184400" y="3009272"/>
+            <a:ext cx="660400" cy="276999"/>
+          </a:xfrm>
+          <a:prstGeom prst="rect">
+            <a:avLst/>
+          </a:prstGeom>
+          <a:noFill/>
+          <a:ln>
+            <a:solidFill>
+              <a:schemeClr val="tx1"/>
+            </a:solidFill>
+          </a:ln>
+        </p:spPr>
+        <p:txBody>
+          <a:bodyPr wrap="square" rtlCol="0">
+            <a:spAutoFit/>
+          </a:bodyPr>
+          <a:lstStyle/>
+          <a:p>
+            <a:pPr algn="ctr"/>
+            <a:r>
+              <a:rPr lang="en-US" sz="1200" dirty="0"/>
+              <a:t>csv</a:t>
+            </a:r>
+          </a:p>
+        </p:txBody>
+      </p:sp>
+      <p:sp>
+        <p:nvSpPr>
+          <p:cNvPr id="64" name="TextBox 63">
+            <a:extLst>
+              <a:ext uri="{FF2B5EF4-FFF2-40B4-BE49-F238E27FC236}">
+                <a16:creationId xmlns:a16="http://schemas.microsoft.com/office/drawing/2014/main" id="{A1C873BF-B311-B165-B2BE-BE93CDA9395F}"/>
+              </a:ext>
+            </a:extLst>
+          </p:cNvPr>
+          <p:cNvSpPr txBox="1"/>
+          <p:nvPr/>
+        </p:nvSpPr>
+        <p:spPr>
+          <a:xfrm>
+            <a:off x="4741333" y="3009272"/>
+            <a:ext cx="836124" cy="276999"/>
+          </a:xfrm>
+          <a:prstGeom prst="rect">
+            <a:avLst/>
+          </a:prstGeom>
+          <a:noFill/>
+          <a:ln>
+            <a:solidFill>
+              <a:schemeClr val="tx1"/>
+            </a:solidFill>
+          </a:ln>
+        </p:spPr>
+        <p:txBody>
+          <a:bodyPr wrap="square" rtlCol="0">
+            <a:spAutoFit/>
+          </a:bodyPr>
+          <a:lstStyle/>
+          <a:p>
+            <a:pPr algn="ctr"/>
+            <a:r>
+              <a:rPr lang="en-US" sz="1200" dirty="0"/>
+              <a:t>mapping</a:t>
+            </a:r>
+          </a:p>
+        </p:txBody>
+      </p:sp>
+      <p:sp>
+        <p:nvSpPr>
+          <p:cNvPr id="65" name="TextBox 64">
+            <a:extLst>
+              <a:ext uri="{FF2B5EF4-FFF2-40B4-BE49-F238E27FC236}">
+                <a16:creationId xmlns:a16="http://schemas.microsoft.com/office/drawing/2014/main" id="{5532E7C1-B0D7-8EA0-9ED8-6EDCEC7054EB}"/>
+              </a:ext>
+            </a:extLst>
+          </p:cNvPr>
+          <p:cNvSpPr txBox="1"/>
+          <p:nvPr/>
+        </p:nvSpPr>
+        <p:spPr>
+          <a:xfrm>
+            <a:off x="7388191" y="3009272"/>
+            <a:ext cx="1005437" cy="276999"/>
+          </a:xfrm>
+          <a:prstGeom prst="rect">
+            <a:avLst/>
+          </a:prstGeom>
+          <a:noFill/>
+          <a:ln>
+            <a:solidFill>
+              <a:schemeClr val="tx1"/>
+            </a:solidFill>
+          </a:ln>
+        </p:spPr>
+        <p:txBody>
+          <a:bodyPr wrap="square" rtlCol="0">
+            <a:spAutoFit/>
+          </a:bodyPr>
+          <a:lstStyle/>
+          <a:p>
+            <a:pPr algn="ctr"/>
+            <a:r>
+              <a:rPr lang="en-US" sz="1200" dirty="0"/>
+              <a:t>Cleaned file</a:t>
+            </a:r>
+          </a:p>
+        </p:txBody>
+      </p:sp>
+      <p:sp>
+        <p:nvSpPr>
+          <p:cNvPr id="67" name="TextBox 66">
+            <a:extLst>
+              <a:ext uri="{FF2B5EF4-FFF2-40B4-BE49-F238E27FC236}">
+                <a16:creationId xmlns:a16="http://schemas.microsoft.com/office/drawing/2014/main" id="{F9CD0E23-1BEF-B930-2084-F90DDFEA2547}"/>
+              </a:ext>
+            </a:extLst>
+          </p:cNvPr>
+          <p:cNvSpPr txBox="1"/>
+          <p:nvPr/>
+        </p:nvSpPr>
+        <p:spPr>
+          <a:xfrm>
+            <a:off x="2184400" y="4516706"/>
+            <a:ext cx="660400" cy="276999"/>
+          </a:xfrm>
+          <a:prstGeom prst="rect">
+            <a:avLst/>
+          </a:prstGeom>
+          <a:noFill/>
+          <a:ln>
+            <a:solidFill>
+              <a:schemeClr val="tx1"/>
+            </a:solidFill>
+          </a:ln>
+        </p:spPr>
+        <p:txBody>
+          <a:bodyPr wrap="square" rtlCol="0">
+            <a:spAutoFit/>
+          </a:bodyPr>
+          <a:lstStyle/>
+          <a:p>
+            <a:pPr algn="ctr"/>
+            <a:r>
+              <a:rPr lang="en-US" sz="1200" dirty="0"/>
+              <a:t>API</a:t>
+            </a:r>
+          </a:p>
+        </p:txBody>
+      </p:sp>
+      <p:sp>
+        <p:nvSpPr>
+          <p:cNvPr id="68" name="TextBox 67">
+            <a:extLst>
+              <a:ext uri="{FF2B5EF4-FFF2-40B4-BE49-F238E27FC236}">
+                <a16:creationId xmlns:a16="http://schemas.microsoft.com/office/drawing/2014/main" id="{AA163DFF-7878-2C56-9A07-6D1FA7AC8817}"/>
+              </a:ext>
+            </a:extLst>
+          </p:cNvPr>
+          <p:cNvSpPr txBox="1"/>
+          <p:nvPr/>
+        </p:nvSpPr>
+        <p:spPr>
+          <a:xfrm>
+            <a:off x="3522157" y="4516706"/>
+            <a:ext cx="660400" cy="276999"/>
+          </a:xfrm>
+          <a:prstGeom prst="rect">
+            <a:avLst/>
+          </a:prstGeom>
+          <a:noFill/>
+          <a:ln>
+            <a:solidFill>
+              <a:schemeClr val="tx1"/>
+            </a:solidFill>
+          </a:ln>
+        </p:spPr>
+        <p:txBody>
+          <a:bodyPr wrap="square" rtlCol="0">
+            <a:spAutoFit/>
+          </a:bodyPr>
+          <a:lstStyle/>
+          <a:p>
+            <a:pPr algn="ctr"/>
+            <a:r>
+              <a:rPr lang="en-US" sz="1200" dirty="0"/>
+              <a:t>csv</a:t>
+            </a:r>
+          </a:p>
+        </p:txBody>
+      </p:sp>
+      <p:sp>
+        <p:nvSpPr>
+          <p:cNvPr id="69" name="TextBox 68">
+            <a:extLst>
+              <a:ext uri="{FF2B5EF4-FFF2-40B4-BE49-F238E27FC236}">
+                <a16:creationId xmlns:a16="http://schemas.microsoft.com/office/drawing/2014/main" id="{C0D83619-1D0D-E628-28B0-BDB642AA5E76}"/>
+              </a:ext>
+            </a:extLst>
+          </p:cNvPr>
+          <p:cNvSpPr txBox="1"/>
+          <p:nvPr/>
+        </p:nvSpPr>
+        <p:spPr>
+          <a:xfrm>
+            <a:off x="4743030" y="4516705"/>
+            <a:ext cx="836124" cy="276999"/>
+          </a:xfrm>
+          <a:prstGeom prst="rect">
+            <a:avLst/>
+          </a:prstGeom>
+          <a:noFill/>
+          <a:ln>
+            <a:solidFill>
+              <a:schemeClr val="tx1"/>
+            </a:solidFill>
+          </a:ln>
+        </p:spPr>
+        <p:txBody>
+          <a:bodyPr wrap="square" rtlCol="0">
+            <a:spAutoFit/>
+          </a:bodyPr>
+          <a:lstStyle/>
+          <a:p>
+            <a:pPr algn="ctr"/>
+            <a:r>
+              <a:rPr lang="en-US" sz="1200" dirty="0"/>
+              <a:t>mapping</a:t>
+            </a:r>
+          </a:p>
+        </p:txBody>
+      </p:sp>
+      <p:sp>
+        <p:nvSpPr>
+          <p:cNvPr id="70" name="TextBox 69">
+            <a:extLst>
+              <a:ext uri="{FF2B5EF4-FFF2-40B4-BE49-F238E27FC236}">
+                <a16:creationId xmlns:a16="http://schemas.microsoft.com/office/drawing/2014/main" id="{21BC5650-54DF-A81C-1C87-0488079DC84F}"/>
+              </a:ext>
+            </a:extLst>
+          </p:cNvPr>
+          <p:cNvSpPr txBox="1"/>
+          <p:nvPr/>
+        </p:nvSpPr>
+        <p:spPr>
+          <a:xfrm>
+            <a:off x="6071240" y="4516705"/>
+            <a:ext cx="963906" cy="276999"/>
+          </a:xfrm>
+          <a:prstGeom prst="rect">
+            <a:avLst/>
+          </a:prstGeom>
+          <a:noFill/>
+          <a:ln>
+            <a:solidFill>
+              <a:schemeClr val="tx1"/>
+            </a:solidFill>
+          </a:ln>
+        </p:spPr>
+        <p:txBody>
+          <a:bodyPr wrap="square" rtlCol="0">
+            <a:spAutoFit/>
+          </a:bodyPr>
+          <a:lstStyle/>
+          <a:p>
+            <a:pPr algn="ctr"/>
+            <a:r>
+              <a:rPr lang="en-US" sz="1200" dirty="0"/>
+              <a:t>preparation</a:t>
+            </a:r>
+          </a:p>
+        </p:txBody>
+      </p:sp>
+      <p:sp>
+        <p:nvSpPr>
+          <p:cNvPr id="71" name="TextBox 70">
+            <a:extLst>
+              <a:ext uri="{FF2B5EF4-FFF2-40B4-BE49-F238E27FC236}">
+                <a16:creationId xmlns:a16="http://schemas.microsoft.com/office/drawing/2014/main" id="{800B295B-B11C-450C-51B0-81A0E435BBD2}"/>
+              </a:ext>
+            </a:extLst>
+          </p:cNvPr>
+          <p:cNvSpPr txBox="1"/>
+          <p:nvPr/>
+        </p:nvSpPr>
+        <p:spPr>
+          <a:xfrm>
+            <a:off x="7388191" y="4520708"/>
+            <a:ext cx="1005437" cy="276999"/>
+          </a:xfrm>
+          <a:prstGeom prst="rect">
+            <a:avLst/>
+          </a:prstGeom>
+          <a:noFill/>
+          <a:ln>
+            <a:solidFill>
+              <a:schemeClr val="tx1"/>
+            </a:solidFill>
+          </a:ln>
+        </p:spPr>
+        <p:txBody>
+          <a:bodyPr wrap="square" rtlCol="0">
+            <a:spAutoFit/>
+          </a:bodyPr>
+          <a:lstStyle/>
+          <a:p>
+            <a:pPr algn="ctr"/>
+            <a:r>
+              <a:rPr lang="en-US" sz="1200" dirty="0"/>
+              <a:t>Cleaned file</a:t>
+            </a:r>
+          </a:p>
+        </p:txBody>
+      </p:sp>
+      <p:sp>
+        <p:nvSpPr>
+          <p:cNvPr id="72" name="TextBox 71">
+            <a:extLst>
+              <a:ext uri="{FF2B5EF4-FFF2-40B4-BE49-F238E27FC236}">
+                <a16:creationId xmlns:a16="http://schemas.microsoft.com/office/drawing/2014/main" id="{047208E3-5236-E427-5312-220201835D95}"/>
+              </a:ext>
+            </a:extLst>
+          </p:cNvPr>
+          <p:cNvSpPr txBox="1"/>
+          <p:nvPr/>
+        </p:nvSpPr>
+        <p:spPr>
+          <a:xfrm>
+            <a:off x="8467136" y="3784629"/>
+            <a:ext cx="660400" cy="276999"/>
+          </a:xfrm>
+          <a:prstGeom prst="rect">
+            <a:avLst/>
+          </a:prstGeom>
+          <a:noFill/>
+          <a:ln>
+            <a:solidFill>
+              <a:schemeClr val="tx1"/>
+            </a:solidFill>
+          </a:ln>
+        </p:spPr>
+        <p:txBody>
+          <a:bodyPr wrap="square" rtlCol="0">
+            <a:spAutoFit/>
+          </a:bodyPr>
+          <a:lstStyle/>
+          <a:p>
+            <a:pPr algn="ctr"/>
+            <a:r>
+              <a:rPr lang="en-US" sz="1200" dirty="0"/>
+              <a:t>merge</a:t>
+            </a:r>
+          </a:p>
+        </p:txBody>
+      </p:sp>
+      <p:sp>
+        <p:nvSpPr>
+          <p:cNvPr id="73" name="TextBox 72">
+            <a:extLst>
+              <a:ext uri="{FF2B5EF4-FFF2-40B4-BE49-F238E27FC236}">
+                <a16:creationId xmlns:a16="http://schemas.microsoft.com/office/drawing/2014/main" id="{F3D5E56B-090E-6268-453D-39A738A52E63}"/>
+              </a:ext>
+            </a:extLst>
+          </p:cNvPr>
+          <p:cNvSpPr txBox="1"/>
+          <p:nvPr/>
+        </p:nvSpPr>
+        <p:spPr>
+          <a:xfrm>
+            <a:off x="9183195" y="3792168"/>
+            <a:ext cx="1005437" cy="276999"/>
+          </a:xfrm>
+          <a:prstGeom prst="rect">
+            <a:avLst/>
+          </a:prstGeom>
+          <a:noFill/>
+          <a:ln>
+            <a:solidFill>
+              <a:schemeClr val="tx1"/>
+            </a:solidFill>
+          </a:ln>
+        </p:spPr>
+        <p:txBody>
+          <a:bodyPr wrap="square" rtlCol="0">
+            <a:spAutoFit/>
+          </a:bodyPr>
+          <a:lstStyle/>
+          <a:p>
+            <a:pPr algn="ctr"/>
+            <a:r>
+              <a:rPr lang="en-US" sz="1200" dirty="0"/>
+              <a:t>Cleaned file</a:t>
+            </a:r>
+          </a:p>
+        </p:txBody>
+      </p:sp>
+      <p:sp>
+        <p:nvSpPr>
+          <p:cNvPr id="74" name="TextBox 73">
+            <a:extLst>
+              <a:ext uri="{FF2B5EF4-FFF2-40B4-BE49-F238E27FC236}">
+                <a16:creationId xmlns:a16="http://schemas.microsoft.com/office/drawing/2014/main" id="{DF3B02FC-FB85-3516-C198-4CAE99C1DD63}"/>
+              </a:ext>
+            </a:extLst>
+          </p:cNvPr>
+          <p:cNvSpPr txBox="1"/>
+          <p:nvPr/>
+        </p:nvSpPr>
+        <p:spPr>
+          <a:xfrm>
+            <a:off x="9034451" y="6434771"/>
+            <a:ext cx="963906" cy="276999"/>
+          </a:xfrm>
+          <a:prstGeom prst="rect">
+            <a:avLst/>
+          </a:prstGeom>
+          <a:noFill/>
+          <a:ln>
+            <a:solidFill>
+              <a:schemeClr val="tx1"/>
+            </a:solidFill>
+          </a:ln>
+        </p:spPr>
+        <p:txBody>
+          <a:bodyPr wrap="square" rtlCol="0">
+            <a:spAutoFit/>
+          </a:bodyPr>
+          <a:lstStyle/>
+          <a:p>
+            <a:pPr algn="ctr"/>
+            <a:r>
+              <a:rPr lang="en-US" sz="1200" dirty="0"/>
+              <a:t>preparation</a:t>
+            </a:r>
+          </a:p>
+        </p:txBody>
+      </p:sp>
+      <p:sp>
+        <p:nvSpPr>
+          <p:cNvPr id="75" name="TextBox 74">
+            <a:extLst>
+              <a:ext uri="{FF2B5EF4-FFF2-40B4-BE49-F238E27FC236}">
+                <a16:creationId xmlns:a16="http://schemas.microsoft.com/office/drawing/2014/main" id="{F6525975-407B-661C-ED9B-C1E1A966D37C}"/>
+              </a:ext>
+            </a:extLst>
+          </p:cNvPr>
+          <p:cNvSpPr txBox="1"/>
+          <p:nvPr/>
+        </p:nvSpPr>
+        <p:spPr>
+          <a:xfrm>
+            <a:off x="10157928" y="6417046"/>
+            <a:ext cx="1879653" cy="276999"/>
+          </a:xfrm>
+          <a:prstGeom prst="rect">
+            <a:avLst/>
+          </a:prstGeom>
+          <a:noFill/>
+          <a:ln>
+            <a:solidFill>
+              <a:schemeClr val="tx1"/>
+            </a:solidFill>
+          </a:ln>
+        </p:spPr>
+        <p:txBody>
+          <a:bodyPr wrap="square" rtlCol="0">
+            <a:spAutoFit/>
+          </a:bodyPr>
+          <a:lstStyle/>
+          <a:p>
+            <a:pPr algn="ctr"/>
+            <a:r>
+              <a:rPr lang="en-US" sz="1200" dirty="0" err="1"/>
+              <a:t>Dataframe</a:t>
+            </a:r>
+            <a:r>
+              <a:rPr lang="en-US" sz="1200" dirty="0"/>
+              <a:t>/Starter Code</a:t>
+            </a:r>
+          </a:p>
+        </p:txBody>
+      </p:sp>
+      <p:graphicFrame>
+        <p:nvGraphicFramePr>
+          <p:cNvPr id="77" name="Table 76">
+            <a:extLst>
+              <a:ext uri="{FF2B5EF4-FFF2-40B4-BE49-F238E27FC236}">
+                <a16:creationId xmlns:a16="http://schemas.microsoft.com/office/drawing/2014/main" id="{9A059A4C-9758-B216-83B4-E4F595DCDB44}"/>
+              </a:ext>
+            </a:extLst>
+          </p:cNvPr>
+          <p:cNvGraphicFramePr>
+            <a:graphicFrameLocks noGrp="1"/>
+          </p:cNvGraphicFramePr>
+          <p:nvPr>
+            <p:extLst>
+              <p:ext uri="{D42A27DB-BD31-4B8C-83A1-F6EECF244321}">
+                <p14:modId xmlns:p14="http://schemas.microsoft.com/office/powerpoint/2010/main" val="3359804413"/>
+              </p:ext>
+            </p:extLst>
+          </p:nvPr>
+        </p:nvGraphicFramePr>
+        <p:xfrm>
+          <a:off x="4720143" y="1898572"/>
+          <a:ext cx="5295972" cy="274320"/>
+        </p:xfrm>
+        <a:graphic>
+          <a:graphicData uri="http://schemas.openxmlformats.org/drawingml/2006/table">
+            <a:tbl>
+              <a:tblPr firstRow="1" bandRow="1">
+                <a:tableStyleId>{5C22544A-7EE6-4342-B048-85BDC9FD1C3A}</a:tableStyleId>
+              </a:tblPr>
+              <a:tblGrid>
+                <a:gridCol w="5295972">
+                  <a:extLst>
+                    <a:ext uri="{9D8B030D-6E8A-4147-A177-3AD203B41FA5}">
+                      <a16:colId xmlns:a16="http://schemas.microsoft.com/office/drawing/2014/main" val="2034438177"/>
+                    </a:ext>
+                  </a:extLst>
+                </a:gridCol>
+              </a:tblGrid>
+              <a:tr h="190878">
+                <a:tc>
+                  <a:txBody>
+                    <a:bodyPr/>
+                    <a:lstStyle/>
+                    <a:p>
+                      <a:pPr algn="ctr"/>
+                      <a:r>
+                        <a:rPr lang="en-US" sz="1200" dirty="0"/>
+                        <a:t>Excel</a:t>
+                      </a:r>
+                    </a:p>
+                  </a:txBody>
+                  <a:tcPr anchor="ctr">
+                    <a:lnL w="12700" cmpd="sng">
+                      <a:noFill/>
+                    </a:lnL>
+                    <a:lnR w="12700" cmpd="sng">
+                      <a:noFill/>
+                    </a:lnR>
+                    <a:lnT w="12700" cmpd="sng">
+                      <a:noFill/>
+                    </a:lnT>
+                    <a:lnB w="38100" cmpd="sng">
+                      <a:noFill/>
+                    </a:lnB>
+                    <a:lnTlToBr w="12700" cmpd="sng">
+                      <a:noFill/>
+                      <a:prstDash val="solid"/>
+                    </a:lnTlToBr>
+                    <a:lnBlToTr w="12700" cmpd="sng">
+                      <a:noFill/>
+                      <a:prstDash val="solid"/>
+                    </a:lnBlToTr>
+                    <a:solidFill>
+                      <a:schemeClr val="accent2">
+                        <a:lumMod val="75000"/>
+                      </a:schemeClr>
+                    </a:solidFill>
+                  </a:tcPr>
+                </a:tc>
+                <a:extLst>
+                  <a:ext uri="{0D108BD9-81ED-4DB2-BD59-A6C34878D82A}">
+                    <a16:rowId xmlns:a16="http://schemas.microsoft.com/office/drawing/2014/main" val="3362466715"/>
+                  </a:ext>
+                </a:extLst>
+              </a:tr>
+            </a:tbl>
+          </a:graphicData>
+        </a:graphic>
+      </p:graphicFrame>
+      <p:graphicFrame>
+        <p:nvGraphicFramePr>
+          <p:cNvPr id="78" name="Table 77">
+            <a:extLst>
+              <a:ext uri="{FF2B5EF4-FFF2-40B4-BE49-F238E27FC236}">
+                <a16:creationId xmlns:a16="http://schemas.microsoft.com/office/drawing/2014/main" id="{93F5F8C1-C36F-FE7B-9011-F8C02A125E33}"/>
+              </a:ext>
+            </a:extLst>
+          </p:cNvPr>
+          <p:cNvGraphicFramePr>
+            <a:graphicFrameLocks noGrp="1"/>
+          </p:cNvGraphicFramePr>
+          <p:nvPr>
+            <p:extLst>
+              <p:ext uri="{D42A27DB-BD31-4B8C-83A1-F6EECF244321}">
+                <p14:modId xmlns:p14="http://schemas.microsoft.com/office/powerpoint/2010/main" val="3409247713"/>
+              </p:ext>
+            </p:extLst>
+          </p:nvPr>
+        </p:nvGraphicFramePr>
+        <p:xfrm>
+          <a:off x="4720143" y="3462773"/>
+          <a:ext cx="3673485" cy="274320"/>
+        </p:xfrm>
+        <a:graphic>
+          <a:graphicData uri="http://schemas.openxmlformats.org/drawingml/2006/table">
+            <a:tbl>
+              <a:tblPr firstRow="1" bandRow="1">
+                <a:tableStyleId>{5C22544A-7EE6-4342-B048-85BDC9FD1C3A}</a:tableStyleId>
+              </a:tblPr>
+              <a:tblGrid>
+                <a:gridCol w="3673485">
+                  <a:extLst>
+                    <a:ext uri="{9D8B030D-6E8A-4147-A177-3AD203B41FA5}">
+                      <a16:colId xmlns:a16="http://schemas.microsoft.com/office/drawing/2014/main" val="2034438177"/>
+                    </a:ext>
+                  </a:extLst>
+                </a:gridCol>
+              </a:tblGrid>
+              <a:tr h="190878">
+                <a:tc>
+                  <a:txBody>
+                    <a:bodyPr/>
+                    <a:lstStyle/>
+                    <a:p>
+                      <a:pPr algn="ctr"/>
+                      <a:r>
+                        <a:rPr lang="en-US" sz="1200" dirty="0"/>
+                        <a:t>Python</a:t>
+                      </a:r>
+                    </a:p>
+                  </a:txBody>
+                  <a:tcPr anchor="ctr">
+                    <a:lnL w="12700" cmpd="sng">
+                      <a:noFill/>
+                    </a:lnL>
+                    <a:lnR w="12700" cmpd="sng">
+                      <a:noFill/>
+                    </a:lnR>
+                    <a:lnT w="12700" cmpd="sng">
+                      <a:noFill/>
+                    </a:lnT>
+                    <a:lnB w="38100" cmpd="sng">
+                      <a:noFill/>
+                    </a:lnB>
+                    <a:lnTlToBr w="12700" cmpd="sng">
+                      <a:noFill/>
+                      <a:prstDash val="solid"/>
+                    </a:lnTlToBr>
+                    <a:lnBlToTr w="12700" cmpd="sng">
+                      <a:noFill/>
+                      <a:prstDash val="solid"/>
+                    </a:lnBlToTr>
+                    <a:solidFill>
+                      <a:schemeClr val="accent6">
+                        <a:lumMod val="75000"/>
+                      </a:schemeClr>
+                    </a:solidFill>
+                  </a:tcPr>
+                </a:tc>
+                <a:extLst>
+                  <a:ext uri="{0D108BD9-81ED-4DB2-BD59-A6C34878D82A}">
+                    <a16:rowId xmlns:a16="http://schemas.microsoft.com/office/drawing/2014/main" val="3362466715"/>
+                  </a:ext>
+                </a:extLst>
+              </a:tr>
+            </a:tbl>
+          </a:graphicData>
+        </a:graphic>
+      </p:graphicFrame>
+      <p:graphicFrame>
+        <p:nvGraphicFramePr>
+          <p:cNvPr id="79" name="Table 78">
+            <a:extLst>
+              <a:ext uri="{FF2B5EF4-FFF2-40B4-BE49-F238E27FC236}">
+                <a16:creationId xmlns:a16="http://schemas.microsoft.com/office/drawing/2014/main" id="{64CA3E7F-20A0-417F-ECD7-97BDF00E8883}"/>
+              </a:ext>
+            </a:extLst>
+          </p:cNvPr>
+          <p:cNvGraphicFramePr>
+            <a:graphicFrameLocks noGrp="1"/>
+          </p:cNvGraphicFramePr>
+          <p:nvPr>
+            <p:extLst>
+              <p:ext uri="{D42A27DB-BD31-4B8C-83A1-F6EECF244321}">
+                <p14:modId xmlns:p14="http://schemas.microsoft.com/office/powerpoint/2010/main" val="1777842145"/>
+              </p:ext>
+            </p:extLst>
+          </p:nvPr>
+        </p:nvGraphicFramePr>
+        <p:xfrm>
+          <a:off x="9034451" y="5434539"/>
+          <a:ext cx="3007673" cy="274320"/>
+        </p:xfrm>
+        <a:graphic>
+          <a:graphicData uri="http://schemas.openxmlformats.org/drawingml/2006/table">
+            <a:tbl>
+              <a:tblPr firstRow="1" bandRow="1">
+                <a:tableStyleId>{5C22544A-7EE6-4342-B048-85BDC9FD1C3A}</a:tableStyleId>
+              </a:tblPr>
+              <a:tblGrid>
+                <a:gridCol w="3007673">
+                  <a:extLst>
+                    <a:ext uri="{9D8B030D-6E8A-4147-A177-3AD203B41FA5}">
+                      <a16:colId xmlns:a16="http://schemas.microsoft.com/office/drawing/2014/main" val="2034438177"/>
+                    </a:ext>
+                  </a:extLst>
+                </a:gridCol>
+              </a:tblGrid>
+              <a:tr h="190878">
+                <a:tc>
+                  <a:txBody>
+                    <a:bodyPr/>
+                    <a:lstStyle/>
+                    <a:p>
+                      <a:pPr algn="ctr"/>
+                      <a:r>
+                        <a:rPr lang="en-US" sz="1200" dirty="0"/>
+                        <a:t>Python</a:t>
+                      </a:r>
+                    </a:p>
+                  </a:txBody>
+                  <a:tcPr anchor="ctr">
+                    <a:lnL w="12700" cmpd="sng">
+                      <a:noFill/>
+                    </a:lnL>
+                    <a:lnR w="12700" cmpd="sng">
+                      <a:noFill/>
+                    </a:lnR>
+                    <a:lnT w="12700" cmpd="sng">
+                      <a:noFill/>
+                    </a:lnT>
+                    <a:lnB w="38100" cmpd="sng">
+                      <a:noFill/>
+                    </a:lnB>
+                    <a:lnTlToBr w="12700" cmpd="sng">
+                      <a:noFill/>
+                      <a:prstDash val="solid"/>
+                    </a:lnTlToBr>
+                    <a:lnBlToTr w="12700" cmpd="sng">
+                      <a:noFill/>
+                      <a:prstDash val="solid"/>
+                    </a:lnBlToTr>
+                    <a:solidFill>
+                      <a:schemeClr val="accent6">
+                        <a:lumMod val="75000"/>
+                      </a:schemeClr>
+                    </a:solidFill>
+                  </a:tcPr>
+                </a:tc>
+                <a:extLst>
+                  <a:ext uri="{0D108BD9-81ED-4DB2-BD59-A6C34878D82A}">
+                    <a16:rowId xmlns:a16="http://schemas.microsoft.com/office/drawing/2014/main" val="3362466715"/>
+                  </a:ext>
+                </a:extLst>
+              </a:tr>
+            </a:tbl>
+          </a:graphicData>
+        </a:graphic>
+      </p:graphicFrame>
     </p:spTree>
     <p:extLst>
       <p:ext uri="{BB962C8B-B14F-4D97-AF65-F5344CB8AC3E}">
-        <p14:creationId xmlns:p14="http://schemas.microsoft.com/office/powerpoint/2010/main" val="1760417424"/>
+        <p14:creationId xmlns:p14="http://schemas.microsoft.com/office/powerpoint/2010/main" val="1112737575"/>
       </p:ext>
     </p:extLst>
   </p:cSld>
@@ -9046,7 +11330,7 @@
           <p:cNvPr id="2" name="Title 1">
             <a:extLst>
               <a:ext uri="{FF2B5EF4-FFF2-40B4-BE49-F238E27FC236}">
-                <a16:creationId xmlns:a16="http://schemas.microsoft.com/office/drawing/2014/main" id="{F992D586-3F7C-3202-E4F4-1F65B9A7D428}"/>
+                <a16:creationId xmlns:a16="http://schemas.microsoft.com/office/drawing/2014/main" id="{14808221-C29B-07A3-B569-B8B466B1020B}"/>
               </a:ext>
             </a:extLst>
           </p:cNvPr>
@@ -9059,8 +11343,8 @@
         </p:nvSpPr>
         <p:spPr>
           <a:xfrm>
-            <a:off x="914399" y="365125"/>
-            <a:ext cx="10363201" cy="1629601"/>
+            <a:off x="6096000" y="375285"/>
+            <a:ext cx="4896678" cy="3624984"/>
           </a:xfrm>
         </p:spPr>
         <p:txBody>
@@ -9069,7 +11353,7 @@
           <a:p>
             <a:r>
               <a:rPr lang="en-US" dirty="0"/>
-              <a:t>[INSERT]</a:t>
+              <a:t>Discussion &amp; findings</a:t>
             </a:r>
           </a:p>
         </p:txBody>
@@ -9079,7 +11363,7 @@
           <p:cNvPr id="3" name="Content Placeholder 2">
             <a:extLst>
               <a:ext uri="{FF2B5EF4-FFF2-40B4-BE49-F238E27FC236}">
-                <a16:creationId xmlns:a16="http://schemas.microsoft.com/office/drawing/2014/main" id="{375DADF2-8E4D-6C0E-0FA2-C5228AF29C1D}"/>
+                <a16:creationId xmlns:a16="http://schemas.microsoft.com/office/drawing/2014/main" id="{D6BEA7D4-8B96-5A0E-252E-6B8E8B1CF178}"/>
               </a:ext>
             </a:extLst>
           </p:cNvPr>
@@ -9092,27 +11376,24 @@
         </p:nvSpPr>
         <p:spPr>
           <a:xfrm>
-            <a:off x="914399" y="2022250"/>
-            <a:ext cx="4992709" cy="3747180"/>
+            <a:off x="6096000" y="4172990"/>
+            <a:ext cx="4896677" cy="2309726"/>
           </a:xfrm>
         </p:spPr>
         <p:txBody>
           <a:bodyPr/>
           <a:lstStyle/>
           <a:p>
-            <a:r>
-              <a:rPr lang="en-US" noProof="1"/>
-              <a:t>…</a:t>
-            </a:r>
-          </a:p>
-        </p:txBody>
-      </p:sp>
-      <p:sp>
-        <p:nvSpPr>
-          <p:cNvPr id="4" name="Content Placeholder 3">
-            <a:extLst>
-              <a:ext uri="{FF2B5EF4-FFF2-40B4-BE49-F238E27FC236}">
-                <a16:creationId xmlns:a16="http://schemas.microsoft.com/office/drawing/2014/main" id="{2CFADA2D-CE7A-511E-45B9-EAF4FA520E34}"/>
+            <a:endParaRPr lang="en-US" noProof="1"/>
+          </a:p>
+        </p:txBody>
+      </p:sp>
+      <p:sp>
+        <p:nvSpPr>
+          <p:cNvPr id="6" name="Picture Placeholder 5">
+            <a:extLst>
+              <a:ext uri="{FF2B5EF4-FFF2-40B4-BE49-F238E27FC236}">
+                <a16:creationId xmlns:a16="http://schemas.microsoft.com/office/drawing/2014/main" id="{1BAFB510-8A22-60EC-15F4-DDD46A895925}"/>
               </a:ext>
             </a:extLst>
           </p:cNvPr>
@@ -9120,57 +11401,14 @@
             <a:spLocks noGrp="1"/>
           </p:cNvSpPr>
           <p:nvPr>
-            <p:ph sz="quarter" idx="11"/>
-          </p:nvPr>
-        </p:nvSpPr>
-        <p:spPr>
-          <a:xfrm>
-            <a:off x="6284891" y="2022250"/>
-            <a:ext cx="4992709" cy="3747180"/>
-          </a:xfrm>
-        </p:spPr>
+            <p:ph type="pic" sz="quarter" idx="11"/>
+          </p:nvPr>
+        </p:nvSpPr>
+        <p:spPr/>
         <p:txBody>
           <a:bodyPr/>
           <a:lstStyle/>
           <a:p>
-            <a:r>
-              <a:rPr lang="en-US" noProof="1"/>
-              <a:t>…</a:t>
-            </a:r>
-          </a:p>
-        </p:txBody>
-      </p:sp>
-      <p:sp>
-        <p:nvSpPr>
-          <p:cNvPr id="5" name="Slide Number Placeholder 4">
-            <a:extLst>
-              <a:ext uri="{FF2B5EF4-FFF2-40B4-BE49-F238E27FC236}">
-                <a16:creationId xmlns:a16="http://schemas.microsoft.com/office/drawing/2014/main" id="{FD4FFC83-A1E8-FCEA-2C47-38C5ADAEA1CA}"/>
-              </a:ext>
-            </a:extLst>
-          </p:cNvPr>
-          <p:cNvSpPr>
-            <a:spLocks noGrp="1"/>
-          </p:cNvSpPr>
-          <p:nvPr>
-            <p:ph type="sldNum" sz="quarter" idx="4"/>
-          </p:nvPr>
-        </p:nvSpPr>
-        <p:spPr>
-          <a:xfrm>
-            <a:off x="914400" y="6246254"/>
-            <a:ext cx="631065" cy="296214"/>
-          </a:xfrm>
-        </p:spPr>
-        <p:txBody>
-          <a:bodyPr/>
-          <a:lstStyle/>
-          <a:p>
-            <a:fld id="{B5CEABB6-07DC-46E8-9B57-56EC44A396E5}" type="slidenum">
-              <a:rPr lang="en-US" smtClean="0"/>
-              <a:pPr/>
-              <a:t>7</a:t>
-            </a:fld>
             <a:endParaRPr lang="en-US" dirty="0"/>
           </a:p>
         </p:txBody>
@@ -9178,7 +11416,7 @@
     </p:spTree>
     <p:extLst>
       <p:ext uri="{BB962C8B-B14F-4D97-AF65-F5344CB8AC3E}">
-        <p14:creationId xmlns:p14="http://schemas.microsoft.com/office/powerpoint/2010/main" val="430403476"/>
+        <p14:creationId xmlns:p14="http://schemas.microsoft.com/office/powerpoint/2010/main" val="1760417424"/>
       </p:ext>
     </p:extLst>
   </p:cSld>
@@ -9210,7 +11448,7 @@
           <p:cNvPr id="2" name="Title 1">
             <a:extLst>
               <a:ext uri="{FF2B5EF4-FFF2-40B4-BE49-F238E27FC236}">
-                <a16:creationId xmlns:a16="http://schemas.microsoft.com/office/drawing/2014/main" id="{6DBDB0AE-5ADD-1975-6BDD-38608925072A}"/>
+                <a16:creationId xmlns:a16="http://schemas.microsoft.com/office/drawing/2014/main" id="{F992D586-3F7C-3202-E4F4-1F65B9A7D428}"/>
               </a:ext>
             </a:extLst>
           </p:cNvPr>
@@ -9223,8 +11461,8 @@
         </p:nvSpPr>
         <p:spPr>
           <a:xfrm>
-            <a:off x="914398" y="365125"/>
-            <a:ext cx="10439401" cy="1617017"/>
+            <a:off x="914399" y="365125"/>
+            <a:ext cx="10363201" cy="1629601"/>
           </a:xfrm>
         </p:spPr>
         <p:txBody>
@@ -9233,7 +11471,7 @@
           <a:p>
             <a:r>
               <a:rPr lang="en-US" dirty="0"/>
-              <a:t>[insert]</a:t>
+              <a:t>[INSERT]</a:t>
             </a:r>
           </a:p>
         </p:txBody>
@@ -9243,7 +11481,7 @@
           <p:cNvPr id="3" name="Content Placeholder 2">
             <a:extLst>
               <a:ext uri="{FF2B5EF4-FFF2-40B4-BE49-F238E27FC236}">
-                <a16:creationId xmlns:a16="http://schemas.microsoft.com/office/drawing/2014/main" id="{E374C67C-D286-74AE-086C-3E45FF9D9542}"/>
+                <a16:creationId xmlns:a16="http://schemas.microsoft.com/office/drawing/2014/main" id="{375DADF2-8E4D-6C0E-0FA2-C5228AF29C1D}"/>
               </a:ext>
             </a:extLst>
           </p:cNvPr>
@@ -9257,7 +11495,7 @@
         <p:spPr>
           <a:xfrm>
             <a:off x="914399" y="2022250"/>
-            <a:ext cx="3310129" cy="3747180"/>
+            <a:ext cx="4992709" cy="3747180"/>
           </a:xfrm>
         </p:spPr>
         <p:txBody>
@@ -9265,28 +11503,10 @@
           <a:lstStyle/>
           <a:p>
             <a:r>
-              <a:rPr lang="en-US" dirty="0"/>
+              <a:rPr lang="en-US" noProof="1"/>
               <a:t>…</a:t>
             </a:r>
           </a:p>
-          <a:p>
-            <a:r>
-              <a:rPr lang="en-US" dirty="0"/>
-              <a:t>…</a:t>
-            </a:r>
-          </a:p>
-          <a:p>
-            <a:r>
-              <a:rPr lang="en-US" dirty="0"/>
-              <a:t>…</a:t>
-            </a:r>
-          </a:p>
-          <a:p>
-            <a:r>
-              <a:rPr lang="en-US" dirty="0"/>
-              <a:t>…</a:t>
-            </a:r>
-          </a:p>
         </p:txBody>
       </p:sp>
       <p:sp>
@@ -9294,7 +11514,7 @@
           <p:cNvPr id="4" name="Content Placeholder 3">
             <a:extLst>
               <a:ext uri="{FF2B5EF4-FFF2-40B4-BE49-F238E27FC236}">
-                <a16:creationId xmlns:a16="http://schemas.microsoft.com/office/drawing/2014/main" id="{701C2F4A-ABC8-39B2-B7BB-36C02B7A4540}"/>
+                <a16:creationId xmlns:a16="http://schemas.microsoft.com/office/drawing/2014/main" id="{2CFADA2D-CE7A-511E-45B9-EAF4FA520E34}"/>
               </a:ext>
             </a:extLst>
           </p:cNvPr>
@@ -9307,8 +11527,8 @@
         </p:nvSpPr>
         <p:spPr>
           <a:xfrm>
-            <a:off x="4602310" y="2018120"/>
-            <a:ext cx="6751489" cy="3747180"/>
+            <a:off x="6284891" y="2022250"/>
+            <a:ext cx="4992709" cy="3747180"/>
           </a:xfrm>
         </p:spPr>
         <p:txBody>
@@ -9316,28 +11536,10 @@
           <a:lstStyle/>
           <a:p>
             <a:r>
-              <a:rPr lang="en-US" dirty="0"/>
+              <a:rPr lang="en-US" noProof="1"/>
               <a:t>…</a:t>
             </a:r>
           </a:p>
-          <a:p>
-            <a:r>
-              <a:rPr lang="en-US" dirty="0"/>
-              <a:t>…</a:t>
-            </a:r>
-          </a:p>
-          <a:p>
-            <a:r>
-              <a:rPr lang="en-US" dirty="0"/>
-              <a:t>…</a:t>
-            </a:r>
-          </a:p>
-          <a:p>
-            <a:r>
-              <a:rPr lang="en-US" dirty="0"/>
-              <a:t>…</a:t>
-            </a:r>
-          </a:p>
         </p:txBody>
       </p:sp>
       <p:sp>
@@ -9345,7 +11547,7 @@
           <p:cNvPr id="5" name="Slide Number Placeholder 4">
             <a:extLst>
               <a:ext uri="{FF2B5EF4-FFF2-40B4-BE49-F238E27FC236}">
-                <a16:creationId xmlns:a16="http://schemas.microsoft.com/office/drawing/2014/main" id="{4D27E5DB-AFB6-9088-87C9-1F671C0B0330}"/>
+                <a16:creationId xmlns:a16="http://schemas.microsoft.com/office/drawing/2014/main" id="{FD4FFC83-A1E8-FCEA-2C47-38C5ADAEA1CA}"/>
               </a:ext>
             </a:extLst>
           </p:cNvPr>
@@ -9378,7 +11580,7 @@
     </p:spTree>
     <p:extLst>
       <p:ext uri="{BB962C8B-B14F-4D97-AF65-F5344CB8AC3E}">
-        <p14:creationId xmlns:p14="http://schemas.microsoft.com/office/powerpoint/2010/main" val="569699605"/>
+        <p14:creationId xmlns:p14="http://schemas.microsoft.com/office/powerpoint/2010/main" val="430403476"/>
       </p:ext>
     </p:extLst>
   </p:cSld>
@@ -9410,7 +11612,7 @@
           <p:cNvPr id="2" name="Title 1">
             <a:extLst>
               <a:ext uri="{FF2B5EF4-FFF2-40B4-BE49-F238E27FC236}">
-                <a16:creationId xmlns:a16="http://schemas.microsoft.com/office/drawing/2014/main" id="{56FEAA13-E02F-EB47-E510-E3F48A95F847}"/>
+                <a16:creationId xmlns:a16="http://schemas.microsoft.com/office/drawing/2014/main" id="{6DBDB0AE-5ADD-1975-6BDD-38608925072A}"/>
               </a:ext>
             </a:extLst>
           </p:cNvPr>
@@ -9423,8 +11625,8 @@
         </p:nvSpPr>
         <p:spPr>
           <a:xfrm>
-            <a:off x="916385" y="446313"/>
-            <a:ext cx="5179615" cy="1448747"/>
+            <a:off x="914398" y="365125"/>
+            <a:ext cx="10439401" cy="1617017"/>
           </a:xfrm>
         </p:spPr>
         <p:txBody>
@@ -9433,7 +11635,7 @@
           <a:p>
             <a:r>
               <a:rPr lang="en-US" dirty="0"/>
-              <a:t>[INSERT]</a:t>
+              <a:t>[insert]</a:t>
             </a:r>
           </a:p>
         </p:txBody>
@@ -9443,7 +11645,7 @@
           <p:cNvPr id="3" name="Content Placeholder 2">
             <a:extLst>
               <a:ext uri="{FF2B5EF4-FFF2-40B4-BE49-F238E27FC236}">
-                <a16:creationId xmlns:a16="http://schemas.microsoft.com/office/drawing/2014/main" id="{05E26637-007F-EC9E-F644-AAFBA0900F3C}"/>
+                <a16:creationId xmlns:a16="http://schemas.microsoft.com/office/drawing/2014/main" id="{E374C67C-D286-74AE-086C-3E45FF9D9542}"/>
               </a:ext>
             </a:extLst>
           </p:cNvPr>
@@ -9457,7 +11659,7 @@
         <p:spPr>
           <a:xfrm>
             <a:off x="914399" y="2022250"/>
-            <a:ext cx="5181600" cy="3747180"/>
+            <a:ext cx="3310129" cy="3747180"/>
           </a:xfrm>
         </p:spPr>
         <p:txBody>
@@ -9465,34 +11667,79 @@
           <a:lstStyle/>
           <a:p>
             <a:r>
-              <a:rPr lang="en-US" b="1" dirty="0"/>
-              <a:t>19XX: </a:t>
-            </a:r>
-            <a:r>
               <a:rPr lang="en-US" dirty="0"/>
               <a:t>…</a:t>
             </a:r>
           </a:p>
           <a:p>
             <a:r>
-              <a:rPr lang="en-US" b="1" dirty="0"/>
-              <a:t>20XX: </a:t>
-            </a:r>
-            <a:r>
               <a:rPr lang="en-US" dirty="0"/>
               <a:t>…</a:t>
             </a:r>
           </a:p>
           <a:p>
             <a:r>
-              <a:rPr lang="en-US" b="1" dirty="0"/>
-              <a:t>20XX: </a:t>
-            </a:r>
-            <a:r>
               <a:rPr lang="en-US" dirty="0"/>
               <a:t>…</a:t>
             </a:r>
           </a:p>
+          <a:p>
+            <a:r>
+              <a:rPr lang="en-US" dirty="0"/>
+              <a:t>…</a:t>
+            </a:r>
+          </a:p>
+        </p:txBody>
+      </p:sp>
+      <p:sp>
+        <p:nvSpPr>
+          <p:cNvPr id="4" name="Content Placeholder 3">
+            <a:extLst>
+              <a:ext uri="{FF2B5EF4-FFF2-40B4-BE49-F238E27FC236}">
+                <a16:creationId xmlns:a16="http://schemas.microsoft.com/office/drawing/2014/main" id="{701C2F4A-ABC8-39B2-B7BB-36C02B7A4540}"/>
+              </a:ext>
+            </a:extLst>
+          </p:cNvPr>
+          <p:cNvSpPr>
+            <a:spLocks noGrp="1"/>
+          </p:cNvSpPr>
+          <p:nvPr>
+            <p:ph sz="quarter" idx="11"/>
+          </p:nvPr>
+        </p:nvSpPr>
+        <p:spPr>
+          <a:xfrm>
+            <a:off x="4602310" y="2018120"/>
+            <a:ext cx="6751489" cy="3747180"/>
+          </a:xfrm>
+        </p:spPr>
+        <p:txBody>
+          <a:bodyPr/>
+          <a:lstStyle/>
+          <a:p>
+            <a:r>
+              <a:rPr lang="en-US" dirty="0"/>
+              <a:t>…</a:t>
+            </a:r>
+          </a:p>
+          <a:p>
+            <a:r>
+              <a:rPr lang="en-US" dirty="0"/>
+              <a:t>…</a:t>
+            </a:r>
+          </a:p>
+          <a:p>
+            <a:r>
+              <a:rPr lang="en-US" dirty="0"/>
+              <a:t>…</a:t>
+            </a:r>
+          </a:p>
+          <a:p>
+            <a:r>
+              <a:rPr lang="en-US" dirty="0"/>
+              <a:t>…</a:t>
+            </a:r>
+          </a:p>
         </p:txBody>
       </p:sp>
       <p:sp>
@@ -9500,7 +11747,7 @@
           <p:cNvPr id="5" name="Slide Number Placeholder 4">
             <a:extLst>
               <a:ext uri="{FF2B5EF4-FFF2-40B4-BE49-F238E27FC236}">
-                <a16:creationId xmlns:a16="http://schemas.microsoft.com/office/drawing/2014/main" id="{1DDD930B-FB1B-543D-6828-8C31F30BBD28}"/>
+                <a16:creationId xmlns:a16="http://schemas.microsoft.com/office/drawing/2014/main" id="{4D27E5DB-AFB6-9088-87C9-1F671C0B0330}"/>
               </a:ext>
             </a:extLst>
           </p:cNvPr>
@@ -9530,35 +11777,10 @@
           </a:p>
         </p:txBody>
       </p:sp>
-      <p:sp>
-        <p:nvSpPr>
-          <p:cNvPr id="6" name="Picture Placeholder 5">
-            <a:extLst>
-              <a:ext uri="{FF2B5EF4-FFF2-40B4-BE49-F238E27FC236}">
-                <a16:creationId xmlns:a16="http://schemas.microsoft.com/office/drawing/2014/main" id="{CFB9537F-2D4C-86A4-1E39-FC84A2DA89F4}"/>
-              </a:ext>
-            </a:extLst>
-          </p:cNvPr>
-          <p:cNvSpPr>
-            <a:spLocks noGrp="1"/>
-          </p:cNvSpPr>
-          <p:nvPr>
-            <p:ph type="pic" sz="quarter" idx="11"/>
-          </p:nvPr>
-        </p:nvSpPr>
-        <p:spPr/>
-        <p:txBody>
-          <a:bodyPr/>
-          <a:lstStyle/>
-          <a:p>
-            <a:endParaRPr lang="en-US"/>
-          </a:p>
-        </p:txBody>
-      </p:sp>
     </p:spTree>
     <p:extLst>
       <p:ext uri="{BB962C8B-B14F-4D97-AF65-F5344CB8AC3E}">
-        <p14:creationId xmlns:p14="http://schemas.microsoft.com/office/powerpoint/2010/main" val="1517447069"/>
+        <p14:creationId xmlns:p14="http://schemas.microsoft.com/office/powerpoint/2010/main" val="569699605"/>
       </p:ext>
     </p:extLst>
   </p:cSld>
@@ -10360,6 +12582,15 @@
 </file>
 
 <file path=customXml/item1.xml><?xml version="1.0" encoding="utf-8"?>
+<?mso-contentType ?>
+<FormTemplates xmlns="http://schemas.microsoft.com/sharepoint/v3/contenttype/forms">
+  <Display>DocumentLibraryForm</Display>
+  <Edit>DocumentLibraryForm</Edit>
+  <New>DocumentLibraryForm</New>
+</FormTemplates>
+</file>
+
+<file path=customXml/item2.xml><?xml version="1.0" encoding="utf-8"?>
 <ct:contentTypeSchema xmlns:ct="http://schemas.microsoft.com/office/2006/metadata/contentType" xmlns:ma="http://schemas.microsoft.com/office/2006/metadata/properties/metaAttributes" ct:_="" ma:_="" ma:contentTypeName="Document" ma:contentTypeID="0x01010079F111ED35F8CC479449609E8A0923A6" ma:contentTypeVersion="28" ma:contentTypeDescription="Create a new document." ma:contentTypeScope="" ma:versionID="60f5a4f2d2b0abadcf532d48ebf9cb71">
   <xsd:schema xmlns:xsd="http://www.w3.org/2001/XMLSchema" xmlns:xs="http://www.w3.org/2001/XMLSchema" xmlns:p="http://schemas.microsoft.com/office/2006/metadata/properties" xmlns:ns1="http://schemas.microsoft.com/sharepoint/v3" xmlns:ns2="71af3243-3dd4-4a8d-8c0d-dd76da1f02a5" xmlns:ns3="16c05727-aa75-4e4a-9b5f-8a80a1165891" xmlns:ns4="230e9df3-be65-4c73-a93b-d1236ebd677e" targetNamespace="http://schemas.microsoft.com/office/2006/metadata/properties" ma:root="true" ma:fieldsID="7dd78129e6a1811f84807ad11c651531" ns1:_="" ns2:_="" ns3:_="" ns4:_="">
     <xsd:import namespace="http://schemas.microsoft.com/sharepoint/v3"/>
@@ -10671,15 +12902,6 @@
 </ct:contentTypeSchema>
 </file>
 
-<file path=customXml/item2.xml><?xml version="1.0" encoding="utf-8"?>
-<?mso-contentType ?>
-<FormTemplates xmlns="http://schemas.microsoft.com/sharepoint/v3/contenttype/forms">
-  <Display>DocumentLibraryForm</Display>
-  <Edit>DocumentLibraryForm</Edit>
-  <New>DocumentLibraryForm</New>
-</FormTemplates>
-</file>
-
 <file path=customXml/item3.xml><?xml version="1.0" encoding="utf-8"?>
 <p:properties xmlns:p="http://schemas.microsoft.com/office/2006/metadata/properties" xmlns:xsi="http://www.w3.org/2001/XMLSchema-instance" xmlns:pc="http://schemas.microsoft.com/office/infopath/2007/PartnerControls">
   <documentManagement>
@@ -10701,6 +12923,14 @@
 </file>
 
 <file path=customXml/itemProps1.xml><?xml version="1.0" encoding="utf-8"?>
+<ds:datastoreItem xmlns:ds="http://schemas.openxmlformats.org/officeDocument/2006/customXml" ds:itemID="{B133F63F-9110-40E7-9727-485934F41506}">
+  <ds:schemaRefs>
+    <ds:schemaRef ds:uri="http://schemas.microsoft.com/sharepoint/v3/contenttype/forms"/>
+  </ds:schemaRefs>
+</ds:datastoreItem>
+</file>
+
+<file path=customXml/itemProps2.xml><?xml version="1.0" encoding="utf-8"?>
 <ds:datastoreItem xmlns:ds="http://schemas.openxmlformats.org/officeDocument/2006/customXml" ds:itemID="{268EFD9E-464D-4A64-8503-21EC02601551}">
   <ds:schemaRefs>
     <ds:schemaRef ds:uri="http://schemas.microsoft.com/office/2006/metadata/contentType"/>
@@ -10721,14 +12951,6 @@
 </ds:datastoreItem>
 </file>
 
-<file path=customXml/itemProps2.xml><?xml version="1.0" encoding="utf-8"?>
-<ds:datastoreItem xmlns:ds="http://schemas.openxmlformats.org/officeDocument/2006/customXml" ds:itemID="{B133F63F-9110-40E7-9727-485934F41506}">
-  <ds:schemaRefs>
-    <ds:schemaRef ds:uri="http://schemas.microsoft.com/sharepoint/v3/contenttype/forms"/>
-  </ds:schemaRefs>
-</ds:datastoreItem>
-</file>
-
 <file path=customXml/itemProps3.xml><?xml version="1.0" encoding="utf-8"?>
 <ds:datastoreItem xmlns:ds="http://schemas.openxmlformats.org/officeDocument/2006/customXml" ds:itemID="{17B53FD5-8F3E-4406-8404-9F78B5E6376E}">
   <ds:schemaRefs>

</xml_diff>